<commit_message>
Translate design to english
</commit_message>
<xml_diff>
--- a/Progress Presentation/Design_Jinsoo.pptx
+++ b/Progress Presentation/Design_Jinsoo.pptx
@@ -112,6 +112,11 @@
       </a:defRPr>
     </a:lvl9pPr>
   </p:defaultTextStyle>
+  <p:extLst>
+    <p:ext uri="{EFAFB233-063F-42B5-8137-9DF3F51BA10A}">
+      <p15:sldGuideLst xmlns:p15="http://schemas.microsoft.com/office/powerpoint/2012/main"/>
+    </p:ext>
+  </p:extLst>
 </p:presentation>
 </file>
 
@@ -197,7 +202,7 @@
           <a:p>
             <a:fld id="{0BAC8372-E4B4-42C7-B893-B76ED21B54B4}" type="datetimeFigureOut">
               <a:rPr lang="en-US" smtClean="0"/>
-              <a:t>6/10/2020</a:t>
+              <a:t>6/11/2020</a:t>
             </a:fld>
             <a:endParaRPr lang="en-US"/>
           </a:p>
@@ -596,7 +601,7 @@
           <a:p>
             <a:fld id="{0D6CDC74-D680-4B38-8B3F-ACDC0215509E}" type="datetimeFigureOut">
               <a:rPr lang="en-US" smtClean="0"/>
-              <a:t>6/10/2020</a:t>
+              <a:t>6/11/2020</a:t>
             </a:fld>
             <a:endParaRPr lang="en-US"/>
           </a:p>
@@ -766,7 +771,7 @@
           <a:p>
             <a:fld id="{0D6CDC74-D680-4B38-8B3F-ACDC0215509E}" type="datetimeFigureOut">
               <a:rPr lang="en-US" smtClean="0"/>
-              <a:t>6/10/2020</a:t>
+              <a:t>6/11/2020</a:t>
             </a:fld>
             <a:endParaRPr lang="en-US"/>
           </a:p>
@@ -946,7 +951,7 @@
           <a:p>
             <a:fld id="{0D6CDC74-D680-4B38-8B3F-ACDC0215509E}" type="datetimeFigureOut">
               <a:rPr lang="en-US" smtClean="0"/>
-              <a:t>6/10/2020</a:t>
+              <a:t>6/11/2020</a:t>
             </a:fld>
             <a:endParaRPr lang="en-US"/>
           </a:p>
@@ -1116,7 +1121,7 @@
           <a:p>
             <a:fld id="{0D6CDC74-D680-4B38-8B3F-ACDC0215509E}" type="datetimeFigureOut">
               <a:rPr lang="en-US" smtClean="0"/>
-              <a:t>6/10/2020</a:t>
+              <a:t>6/11/2020</a:t>
             </a:fld>
             <a:endParaRPr lang="en-US"/>
           </a:p>
@@ -1362,7 +1367,7 @@
           <a:p>
             <a:fld id="{0D6CDC74-D680-4B38-8B3F-ACDC0215509E}" type="datetimeFigureOut">
               <a:rPr lang="en-US" smtClean="0"/>
-              <a:t>6/10/2020</a:t>
+              <a:t>6/11/2020</a:t>
             </a:fld>
             <a:endParaRPr lang="en-US"/>
           </a:p>
@@ -1594,7 +1599,7 @@
           <a:p>
             <a:fld id="{0D6CDC74-D680-4B38-8B3F-ACDC0215509E}" type="datetimeFigureOut">
               <a:rPr lang="en-US" smtClean="0"/>
-              <a:t>6/10/2020</a:t>
+              <a:t>6/11/2020</a:t>
             </a:fld>
             <a:endParaRPr lang="en-US"/>
           </a:p>
@@ -1961,7 +1966,7 @@
           <a:p>
             <a:fld id="{0D6CDC74-D680-4B38-8B3F-ACDC0215509E}" type="datetimeFigureOut">
               <a:rPr lang="en-US" smtClean="0"/>
-              <a:t>6/10/2020</a:t>
+              <a:t>6/11/2020</a:t>
             </a:fld>
             <a:endParaRPr lang="en-US"/>
           </a:p>
@@ -2079,7 +2084,7 @@
           <a:p>
             <a:fld id="{0D6CDC74-D680-4B38-8B3F-ACDC0215509E}" type="datetimeFigureOut">
               <a:rPr lang="en-US" smtClean="0"/>
-              <a:t>6/10/2020</a:t>
+              <a:t>6/11/2020</a:t>
             </a:fld>
             <a:endParaRPr lang="en-US"/>
           </a:p>
@@ -2174,7 +2179,7 @@
           <a:p>
             <a:fld id="{0D6CDC74-D680-4B38-8B3F-ACDC0215509E}" type="datetimeFigureOut">
               <a:rPr lang="en-US" smtClean="0"/>
-              <a:t>6/10/2020</a:t>
+              <a:t>6/11/2020</a:t>
             </a:fld>
             <a:endParaRPr lang="en-US"/>
           </a:p>
@@ -2451,7 +2456,7 @@
           <a:p>
             <a:fld id="{0D6CDC74-D680-4B38-8B3F-ACDC0215509E}" type="datetimeFigureOut">
               <a:rPr lang="en-US" smtClean="0"/>
-              <a:t>6/10/2020</a:t>
+              <a:t>6/11/2020</a:t>
             </a:fld>
             <a:endParaRPr lang="en-US"/>
           </a:p>
@@ -2704,7 +2709,7 @@
           <a:p>
             <a:fld id="{0D6CDC74-D680-4B38-8B3F-ACDC0215509E}" type="datetimeFigureOut">
               <a:rPr lang="en-US" smtClean="0"/>
-              <a:t>6/10/2020</a:t>
+              <a:t>6/11/2020</a:t>
             </a:fld>
             <a:endParaRPr lang="en-US"/>
           </a:p>
@@ -2917,7 +2922,7 @@
           <a:p>
             <a:fld id="{0D6CDC74-D680-4B38-8B3F-ACDC0215509E}" type="datetimeFigureOut">
               <a:rPr lang="en-US" smtClean="0"/>
-              <a:t>6/10/2020</a:t>
+              <a:t>6/11/2020</a:t>
             </a:fld>
             <a:endParaRPr lang="en-US"/>
           </a:p>
@@ -3725,18 +3730,25 @@
           <a:lstStyle/>
           <a:p>
             <a:r>
-              <a:rPr lang="ko-KR" altLang="en-US" smtClean="0">
+              <a:rPr lang="en-US" altLang="ko-KR">
                 <a:latin typeface="나눔스퀘어 Bold" panose="020B0600000101010101" pitchFamily="50" charset="-127"/>
                 <a:ea typeface="나눔스퀘어 Bold" panose="020B0600000101010101" pitchFamily="50" charset="-127"/>
               </a:rPr>
-              <a:t>공이 삼각형 빗면을 타고 아래로 떨어진다</a:t>
+              <a:t>The ball falls </a:t>
+            </a:r>
+            <a:r>
+              <a:rPr lang="en-US" altLang="ko-KR">
+                <a:latin typeface="나눔스퀘어 Bold" panose="020B0600000101010101" pitchFamily="50" charset="-127"/>
+                <a:ea typeface="나눔스퀘어 Bold" panose="020B0600000101010101" pitchFamily="50" charset="-127"/>
+              </a:rPr>
+              <a:t>down </a:t>
             </a:r>
             <a:r>
               <a:rPr lang="en-US" altLang="ko-KR" smtClean="0">
                 <a:latin typeface="나눔스퀘어 Bold" panose="020B0600000101010101" pitchFamily="50" charset="-127"/>
                 <a:ea typeface="나눔스퀘어 Bold" panose="020B0600000101010101" pitchFamily="50" charset="-127"/>
               </a:rPr>
-              <a:t>.</a:t>
+              <a:t>through the inclined plane.</a:t>
             </a:r>
             <a:endParaRPr lang="en-US">
               <a:latin typeface="나눔스퀘어 Bold" panose="020B0600000101010101" pitchFamily="50" charset="-127"/>
@@ -4057,35 +4069,16 @@
           <a:lstStyle/>
           <a:p>
             <a:r>
-              <a:rPr lang="ko-KR" altLang="en-US" smtClean="0">
+              <a:rPr lang="en-US" altLang="ko-KR">
                 <a:latin typeface="나눔스퀘어 Bold" panose="020B0600000101010101" pitchFamily="50" charset="-127"/>
                 <a:ea typeface="나눔스퀘어 Bold" panose="020B0600000101010101" pitchFamily="50" charset="-127"/>
               </a:rPr>
-              <a:t>우측 방향 속도를 갖고 있는 공이 왼쪽위에서 부터 날아온다</a:t>
+              <a:t>A ball with a rightward speed flies from the top left. The fans below prevent the ball from falling to the floor and move at a constant speed to the right.</a:t>
             </a:r>
-            <a:r>
-              <a:rPr lang="en-US" altLang="ko-KR" smtClean="0">
-                <a:latin typeface="나눔스퀘어 Bold" panose="020B0600000101010101" pitchFamily="50" charset="-127"/>
-                <a:ea typeface="나눔스퀘어 Bold" panose="020B0600000101010101" pitchFamily="50" charset="-127"/>
-              </a:rPr>
-              <a:t>.</a:t>
-            </a:r>
-          </a:p>
-          <a:p>
-            <a:r>
-              <a:rPr lang="ko-KR" altLang="en-US" smtClean="0">
-                <a:latin typeface="나눔스퀘어 Bold" panose="020B0600000101010101" pitchFamily="50" charset="-127"/>
-                <a:ea typeface="나눔스퀘어 Bold" panose="020B0600000101010101" pitchFamily="50" charset="-127"/>
-              </a:rPr>
-              <a:t>아래의 선풍기들은 공이 바닥으로 떨어지지 않게 하는 역할을 하며 오른쪽으로 등속도운동한다</a:t>
-            </a:r>
-            <a:r>
-              <a:rPr lang="en-US" altLang="ko-KR" smtClean="0">
-                <a:latin typeface="나눔스퀘어 Bold" panose="020B0600000101010101" pitchFamily="50" charset="-127"/>
-                <a:ea typeface="나눔스퀘어 Bold" panose="020B0600000101010101" pitchFamily="50" charset="-127"/>
-              </a:rPr>
-              <a:t>.</a:t>
-            </a:r>
+            <a:endParaRPr lang="en-US" altLang="ko-KR" smtClean="0">
+              <a:latin typeface="나눔스퀘어 Bold" panose="020B0600000101010101" pitchFamily="50" charset="-127"/>
+              <a:ea typeface="나눔스퀘어 Bold" panose="020B0600000101010101" pitchFamily="50" charset="-127"/>
+            </a:endParaRPr>
           </a:p>
         </p:txBody>
       </p:sp>
@@ -5368,7 +5361,7 @@
         <p:spPr>
           <a:xfrm>
             <a:off x="7170420" y="1075030"/>
-            <a:ext cx="3893820" cy="1477328"/>
+            <a:ext cx="3893820" cy="1754326"/>
           </a:xfrm>
           <a:prstGeom prst="rect">
             <a:avLst/>
@@ -5382,35 +5375,37 @@
           <a:lstStyle/>
           <a:p>
             <a:r>
-              <a:rPr lang="ko-KR" altLang="en-US" smtClean="0">
+              <a:rPr lang="en-US" altLang="ko-KR">
                 <a:latin typeface="나눔스퀘어 Bold" panose="020B0600000101010101" pitchFamily="50" charset="-127"/>
                 <a:ea typeface="나눔스퀘어 Bold" panose="020B0600000101010101" pitchFamily="50" charset="-127"/>
               </a:rPr>
-              <a:t>공이 빨간색 지점을 지나는 동안 강한 바람이 불어 원뿔 구조물을 위로 띄운다</a:t>
+              <a:t>As the ball passes the red spot, a strong wind blows the cone up. </a:t>
+            </a:r>
+            <a:r>
+              <a:rPr lang="en-US" altLang="ko-KR">
+                <a:latin typeface="나눔스퀘어 Bold" panose="020B0600000101010101" pitchFamily="50" charset="-127"/>
+                <a:ea typeface="나눔스퀘어 Bold" panose="020B0600000101010101" pitchFamily="50" charset="-127"/>
+              </a:rPr>
+              <a:t>When </a:t>
             </a:r>
             <a:r>
               <a:rPr lang="en-US" altLang="ko-KR" smtClean="0">
                 <a:latin typeface="나눔스퀘어 Bold" panose="020B0600000101010101" pitchFamily="50" charset="-127"/>
                 <a:ea typeface="나눔스퀘어 Bold" panose="020B0600000101010101" pitchFamily="50" charset="-127"/>
               </a:rPr>
-              <a:t>.</a:t>
+              <a:t>the ball passes </a:t>
             </a:r>
-          </a:p>
-          <a:p>
             <a:r>
-              <a:rPr lang="ko-KR" altLang="en-US" smtClean="0">
+              <a:rPr lang="en-US" altLang="ko-KR">
                 <a:latin typeface="나눔스퀘어 Bold" panose="020B0600000101010101" pitchFamily="50" charset="-127"/>
                 <a:ea typeface="나눔스퀘어 Bold" panose="020B0600000101010101" pitchFamily="50" charset="-127"/>
               </a:rPr>
-              <a:t>빨간색 지점을 지나치면 원뿔이 떨어지기 시작하며 공은 원뿔이 떨어지기 전에 해당 부분을 지나친다</a:t>
+              <a:t>the red point, the cone begins to fall, and the ball passes over it before the cone falls.</a:t>
             </a:r>
-            <a:r>
-              <a:rPr lang="en-US" altLang="ko-KR" smtClean="0">
-                <a:latin typeface="나눔스퀘어 Bold" panose="020B0600000101010101" pitchFamily="50" charset="-127"/>
-                <a:ea typeface="나눔스퀘어 Bold" panose="020B0600000101010101" pitchFamily="50" charset="-127"/>
-              </a:rPr>
-              <a:t>.</a:t>
-            </a:r>
+            <a:endParaRPr lang="en-US" altLang="ko-KR" smtClean="0">
+              <a:latin typeface="나눔스퀘어 Bold" panose="020B0600000101010101" pitchFamily="50" charset="-127"/>
+              <a:ea typeface="나눔스퀘어 Bold" panose="020B0600000101010101" pitchFamily="50" charset="-127"/>
+            </a:endParaRPr>
           </a:p>
         </p:txBody>
       </p:sp>
@@ -6028,608 +6023,638 @@
           </a:p>
         </p:txBody>
       </p:sp>
-      <p:sp>
-        <p:nvSpPr>
-          <p:cNvPr id="3" name="직사각형 2"/>
-          <p:cNvSpPr/>
-          <p:nvPr/>
-        </p:nvSpPr>
-        <p:spPr>
-          <a:xfrm>
-            <a:off x="3094627" y="4062693"/>
-            <a:ext cx="4959713" cy="268440"/>
-          </a:xfrm>
-          <a:prstGeom prst="rect">
-            <a:avLst/>
-          </a:prstGeom>
-          <a:solidFill>
-            <a:schemeClr val="tx1">
-              <a:lumMod val="50000"/>
-              <a:lumOff val="50000"/>
-            </a:schemeClr>
-          </a:solidFill>
-          <a:ln w="19050">
-            <a:solidFill>
-              <a:schemeClr val="tx1"/>
-            </a:solidFill>
-          </a:ln>
-        </p:spPr>
-        <p:style>
-          <a:lnRef idx="2">
-            <a:schemeClr val="accent1">
-              <a:shade val="50000"/>
-            </a:schemeClr>
-          </a:lnRef>
-          <a:fillRef idx="1">
-            <a:schemeClr val="accent1"/>
-          </a:fillRef>
-          <a:effectRef idx="0">
-            <a:schemeClr val="accent1"/>
-          </a:effectRef>
-          <a:fontRef idx="minor">
-            <a:schemeClr val="lt1"/>
-          </a:fontRef>
-        </p:style>
-        <p:txBody>
-          <a:bodyPr rtlCol="0" anchor="ctr"/>
-          <a:lstStyle/>
-          <a:p>
-            <a:pPr algn="ctr"/>
-            <a:endParaRPr lang="en-US"/>
-          </a:p>
-        </p:txBody>
-      </p:sp>
-      <p:sp>
-        <p:nvSpPr>
-          <p:cNvPr id="9" name="타원 8"/>
-          <p:cNvSpPr/>
-          <p:nvPr/>
-        </p:nvSpPr>
-        <p:spPr>
-          <a:xfrm>
-            <a:off x="5407953" y="3696810"/>
-            <a:ext cx="333059" cy="333059"/>
-          </a:xfrm>
-          <a:prstGeom prst="ellipse">
-            <a:avLst/>
-          </a:prstGeom>
-          <a:solidFill>
-            <a:srgbClr val="7F7F7F"/>
-          </a:solidFill>
-          <a:ln w="19050">
-            <a:solidFill>
-              <a:schemeClr val="tx1"/>
-            </a:solidFill>
-          </a:ln>
-        </p:spPr>
-        <p:style>
-          <a:lnRef idx="2">
-            <a:schemeClr val="accent1">
-              <a:shade val="50000"/>
-            </a:schemeClr>
-          </a:lnRef>
-          <a:fillRef idx="1">
-            <a:schemeClr val="accent1"/>
-          </a:fillRef>
-          <a:effectRef idx="0">
-            <a:schemeClr val="accent1"/>
-          </a:effectRef>
-          <a:fontRef idx="minor">
-            <a:schemeClr val="lt1"/>
-          </a:fontRef>
-        </p:style>
-        <p:txBody>
-          <a:bodyPr rtlCol="0" anchor="ctr"/>
-          <a:lstStyle/>
-          <a:p>
-            <a:pPr algn="ctr"/>
-            <a:endParaRPr lang="en-US"/>
-          </a:p>
-        </p:txBody>
-      </p:sp>
-      <p:sp>
-        <p:nvSpPr>
-          <p:cNvPr id="14" name="직사각형 13"/>
-          <p:cNvSpPr/>
-          <p:nvPr/>
-        </p:nvSpPr>
-        <p:spPr>
-          <a:xfrm>
-            <a:off x="838200" y="3497580"/>
-            <a:ext cx="1043940" cy="833553"/>
-          </a:xfrm>
-          <a:prstGeom prst="rect">
-            <a:avLst/>
-          </a:prstGeom>
-          <a:solidFill>
-            <a:srgbClr val="7F7F7F"/>
-          </a:solidFill>
-          <a:ln w="38100">
-            <a:solidFill>
-              <a:schemeClr val="tx1"/>
-            </a:solidFill>
-          </a:ln>
-        </p:spPr>
-        <p:style>
-          <a:lnRef idx="2">
-            <a:schemeClr val="accent1">
-              <a:shade val="50000"/>
-            </a:schemeClr>
-          </a:lnRef>
-          <a:fillRef idx="1">
-            <a:schemeClr val="accent1"/>
-          </a:fillRef>
-          <a:effectRef idx="0">
-            <a:schemeClr val="accent1"/>
-          </a:effectRef>
-          <a:fontRef idx="minor">
-            <a:schemeClr val="lt1"/>
-          </a:fontRef>
-        </p:style>
-        <p:txBody>
-          <a:bodyPr rtlCol="0" anchor="ctr"/>
-          <a:lstStyle/>
-          <a:p>
-            <a:pPr algn="ctr"/>
-            <a:endParaRPr lang="en-US"/>
-          </a:p>
-        </p:txBody>
-      </p:sp>
-      <p:sp>
-        <p:nvSpPr>
-          <p:cNvPr id="18" name="직사각형 17"/>
-          <p:cNvSpPr/>
-          <p:nvPr/>
-        </p:nvSpPr>
-        <p:spPr>
-          <a:xfrm flipH="1">
-            <a:off x="9083040" y="3497580"/>
-            <a:ext cx="1043940" cy="833553"/>
-          </a:xfrm>
-          <a:prstGeom prst="rect">
-            <a:avLst/>
-          </a:prstGeom>
-          <a:solidFill>
-            <a:srgbClr val="7F7F7F"/>
-          </a:solidFill>
-          <a:ln w="38100">
-            <a:solidFill>
-              <a:schemeClr val="tx1"/>
-            </a:solidFill>
-          </a:ln>
-        </p:spPr>
-        <p:style>
-          <a:lnRef idx="2">
-            <a:schemeClr val="accent1">
-              <a:shade val="50000"/>
-            </a:schemeClr>
-          </a:lnRef>
-          <a:fillRef idx="1">
-            <a:schemeClr val="accent1"/>
-          </a:fillRef>
-          <a:effectRef idx="0">
-            <a:schemeClr val="accent1"/>
-          </a:effectRef>
-          <a:fontRef idx="minor">
-            <a:schemeClr val="lt1"/>
-          </a:fontRef>
-        </p:style>
-        <p:txBody>
-          <a:bodyPr rtlCol="0" anchor="ctr"/>
-          <a:lstStyle/>
-          <a:p>
-            <a:pPr algn="ctr"/>
-            <a:endParaRPr lang="en-US"/>
-          </a:p>
-        </p:txBody>
-      </p:sp>
-      <p:cxnSp>
-        <p:nvCxnSpPr>
-          <p:cNvPr id="20" name="직선 연결선 19"/>
-          <p:cNvCxnSpPr/>
-          <p:nvPr/>
-        </p:nvCxnSpPr>
-        <p:spPr>
-          <a:xfrm>
-            <a:off x="5574482" y="2049780"/>
-            <a:ext cx="0" cy="3375660"/>
-          </a:xfrm>
-          <a:prstGeom prst="line">
-            <a:avLst/>
-          </a:prstGeom>
-          <a:ln w="28575">
-            <a:solidFill>
-              <a:schemeClr val="tx1"/>
-            </a:solidFill>
-            <a:prstDash val="sysDot"/>
-          </a:ln>
-        </p:spPr>
-        <p:style>
-          <a:lnRef idx="1">
-            <a:schemeClr val="accent1"/>
-          </a:lnRef>
-          <a:fillRef idx="0">
-            <a:schemeClr val="accent1"/>
-          </a:fillRef>
-          <a:effectRef idx="0">
-            <a:schemeClr val="accent1"/>
-          </a:effectRef>
-          <a:fontRef idx="minor">
-            <a:schemeClr val="tx1"/>
-          </a:fontRef>
-        </p:style>
-      </p:cxnSp>
-      <p:cxnSp>
-        <p:nvCxnSpPr>
-          <p:cNvPr id="23" name="직선 화살표 연결선 22"/>
-          <p:cNvCxnSpPr/>
-          <p:nvPr/>
-        </p:nvCxnSpPr>
-        <p:spPr>
-          <a:xfrm>
-            <a:off x="4458152" y="3322320"/>
-            <a:ext cx="2232660" cy="0"/>
-          </a:xfrm>
-          <a:prstGeom prst="straightConnector1">
-            <a:avLst/>
-          </a:prstGeom>
-          <a:ln w="38100">
-            <a:headEnd type="triangle"/>
-            <a:tailEnd type="triangle"/>
-          </a:ln>
-        </p:spPr>
-        <p:style>
-          <a:lnRef idx="1">
-            <a:schemeClr val="dk1"/>
-          </a:lnRef>
-          <a:fillRef idx="0">
-            <a:schemeClr val="dk1"/>
-          </a:fillRef>
-          <a:effectRef idx="0">
-            <a:schemeClr val="dk1"/>
-          </a:effectRef>
-          <a:fontRef idx="minor">
-            <a:schemeClr val="tx1"/>
-          </a:fontRef>
-        </p:style>
-      </p:cxnSp>
       <p:grpSp>
         <p:nvGrpSpPr>
-          <p:cNvPr id="28" name="그룹 27"/>
+          <p:cNvPr id="5" name="그룹 4"/>
           <p:cNvGrpSpPr/>
           <p:nvPr/>
         </p:nvGrpSpPr>
         <p:grpSpPr>
           <a:xfrm>
-            <a:off x="2415540" y="3621572"/>
-            <a:ext cx="374287" cy="674132"/>
-            <a:chOff x="2484957" y="3552944"/>
-            <a:chExt cx="374287" cy="674132"/>
+            <a:off x="838200" y="2361470"/>
+            <a:ext cx="9288780" cy="3451530"/>
+            <a:chOff x="838200" y="1973910"/>
+            <a:chExt cx="9288780" cy="3451530"/>
           </a:xfrm>
         </p:grpSpPr>
-        <p:sp>
-          <p:nvSpPr>
-            <p:cNvPr id="25" name="TextBox 24"/>
-            <p:cNvSpPr txBox="1"/>
+        <p:grpSp>
+          <p:nvGrpSpPr>
+            <p:cNvPr id="28" name="그룹 27"/>
+            <p:cNvGrpSpPr/>
             <p:nvPr/>
-          </p:nvSpPr>
-          <p:spPr>
+          </p:nvGrpSpPr>
+          <p:grpSpPr>
             <a:xfrm>
-              <a:off x="2484957" y="3552944"/>
-              <a:ext cx="374287" cy="369332"/>
+              <a:off x="2415540" y="3621572"/>
+              <a:ext cx="374287" cy="674132"/>
+              <a:chOff x="2484957" y="3552944"/>
+              <a:chExt cx="374287" cy="674132"/>
             </a:xfrm>
-            <a:prstGeom prst="rect">
-              <a:avLst/>
-            </a:prstGeom>
-            <a:noFill/>
-          </p:spPr>
-          <p:txBody>
-            <a:bodyPr wrap="square" rtlCol="0">
-              <a:spAutoFit/>
-            </a:bodyPr>
-            <a:lstStyle/>
-            <a:p>
-              <a:r>
-                <a:rPr lang="en-US" smtClean="0"/>
-                <a:t>~</a:t>
-              </a:r>
-              <a:endParaRPr lang="en-US"/>
-            </a:p>
-          </p:txBody>
-        </p:sp>
-        <p:sp>
-          <p:nvSpPr>
-            <p:cNvPr id="26" name="TextBox 25"/>
-            <p:cNvSpPr txBox="1"/>
+          </p:grpSpPr>
+          <p:sp>
+            <p:nvSpPr>
+              <p:cNvPr id="25" name="TextBox 24"/>
+              <p:cNvSpPr txBox="1"/>
+              <p:nvPr/>
+            </p:nvSpPr>
+            <p:spPr>
+              <a:xfrm>
+                <a:off x="2484957" y="3552944"/>
+                <a:ext cx="374287" cy="369332"/>
+              </a:xfrm>
+              <a:prstGeom prst="rect">
+                <a:avLst/>
+              </a:prstGeom>
+              <a:noFill/>
+            </p:spPr>
+            <p:txBody>
+              <a:bodyPr wrap="square" rtlCol="0">
+                <a:spAutoFit/>
+              </a:bodyPr>
+              <a:lstStyle/>
+              <a:p>
+                <a:r>
+                  <a:rPr lang="en-US" smtClean="0"/>
+                  <a:t>~</a:t>
+                </a:r>
+                <a:endParaRPr lang="en-US"/>
+              </a:p>
+            </p:txBody>
+          </p:sp>
+          <p:sp>
+            <p:nvSpPr>
+              <p:cNvPr id="26" name="TextBox 25"/>
+              <p:cNvSpPr txBox="1"/>
+              <p:nvPr/>
+            </p:nvSpPr>
+            <p:spPr>
+              <a:xfrm>
+                <a:off x="2484957" y="3705344"/>
+                <a:ext cx="374287" cy="369332"/>
+              </a:xfrm>
+              <a:prstGeom prst="rect">
+                <a:avLst/>
+              </a:prstGeom>
+              <a:noFill/>
+            </p:spPr>
+            <p:txBody>
+              <a:bodyPr wrap="square" rtlCol="0">
+                <a:spAutoFit/>
+              </a:bodyPr>
+              <a:lstStyle/>
+              <a:p>
+                <a:r>
+                  <a:rPr lang="en-US" smtClean="0"/>
+                  <a:t>~</a:t>
+                </a:r>
+                <a:endParaRPr lang="en-US"/>
+              </a:p>
+            </p:txBody>
+          </p:sp>
+          <p:sp>
+            <p:nvSpPr>
+              <p:cNvPr id="27" name="TextBox 26"/>
+              <p:cNvSpPr txBox="1"/>
+              <p:nvPr/>
+            </p:nvSpPr>
+            <p:spPr>
+              <a:xfrm>
+                <a:off x="2484957" y="3857744"/>
+                <a:ext cx="374287" cy="369332"/>
+              </a:xfrm>
+              <a:prstGeom prst="rect">
+                <a:avLst/>
+              </a:prstGeom>
+              <a:noFill/>
+            </p:spPr>
+            <p:txBody>
+              <a:bodyPr wrap="square" rtlCol="0">
+                <a:spAutoFit/>
+              </a:bodyPr>
+              <a:lstStyle/>
+              <a:p>
+                <a:r>
+                  <a:rPr lang="en-US" smtClean="0"/>
+                  <a:t>~</a:t>
+                </a:r>
+                <a:endParaRPr lang="en-US"/>
+              </a:p>
+            </p:txBody>
+          </p:sp>
+        </p:grpSp>
+        <p:grpSp>
+          <p:nvGrpSpPr>
+            <p:cNvPr id="4" name="그룹 3"/>
+            <p:cNvGrpSpPr/>
             <p:nvPr/>
-          </p:nvSpPr>
-          <p:spPr>
+          </p:nvGrpSpPr>
+          <p:grpSpPr>
             <a:xfrm>
-              <a:off x="2484957" y="3705344"/>
-              <a:ext cx="374287" cy="369332"/>
+              <a:off x="838200" y="1973910"/>
+              <a:ext cx="9288780" cy="3451530"/>
+              <a:chOff x="838200" y="1973910"/>
+              <a:chExt cx="9288780" cy="3451530"/>
             </a:xfrm>
-            <a:prstGeom prst="rect">
-              <a:avLst/>
-            </a:prstGeom>
-            <a:noFill/>
-          </p:spPr>
-          <p:txBody>
-            <a:bodyPr wrap="square" rtlCol="0">
-              <a:spAutoFit/>
-            </a:bodyPr>
-            <a:lstStyle/>
-            <a:p>
-              <a:r>
-                <a:rPr lang="en-US" smtClean="0"/>
-                <a:t>~</a:t>
-              </a:r>
-              <a:endParaRPr lang="en-US"/>
-            </a:p>
-          </p:txBody>
-        </p:sp>
-        <p:sp>
-          <p:nvSpPr>
-            <p:cNvPr id="27" name="TextBox 26"/>
-            <p:cNvSpPr txBox="1"/>
-            <p:nvPr/>
-          </p:nvSpPr>
-          <p:spPr>
-            <a:xfrm>
-              <a:off x="2484957" y="3857744"/>
-              <a:ext cx="374287" cy="369332"/>
-            </a:xfrm>
-            <a:prstGeom prst="rect">
-              <a:avLst/>
-            </a:prstGeom>
-            <a:noFill/>
-          </p:spPr>
-          <p:txBody>
-            <a:bodyPr wrap="square" rtlCol="0">
-              <a:spAutoFit/>
-            </a:bodyPr>
-            <a:lstStyle/>
-            <a:p>
-              <a:r>
-                <a:rPr lang="en-US" smtClean="0"/>
-                <a:t>~</a:t>
-              </a:r>
-              <a:endParaRPr lang="en-US"/>
-            </a:p>
-          </p:txBody>
-        </p:sp>
+          </p:grpSpPr>
+          <p:sp>
+            <p:nvSpPr>
+              <p:cNvPr id="3" name="직사각형 2"/>
+              <p:cNvSpPr/>
+              <p:nvPr/>
+            </p:nvSpPr>
+            <p:spPr>
+              <a:xfrm>
+                <a:off x="3094627" y="4062693"/>
+                <a:ext cx="4959713" cy="268440"/>
+              </a:xfrm>
+              <a:prstGeom prst="rect">
+                <a:avLst/>
+              </a:prstGeom>
+              <a:solidFill>
+                <a:schemeClr val="tx1">
+                  <a:lumMod val="50000"/>
+                  <a:lumOff val="50000"/>
+                </a:schemeClr>
+              </a:solidFill>
+              <a:ln w="19050">
+                <a:solidFill>
+                  <a:schemeClr val="tx1"/>
+                </a:solidFill>
+              </a:ln>
+            </p:spPr>
+            <p:style>
+              <a:lnRef idx="2">
+                <a:schemeClr val="accent1">
+                  <a:shade val="50000"/>
+                </a:schemeClr>
+              </a:lnRef>
+              <a:fillRef idx="1">
+                <a:schemeClr val="accent1"/>
+              </a:fillRef>
+              <a:effectRef idx="0">
+                <a:schemeClr val="accent1"/>
+              </a:effectRef>
+              <a:fontRef idx="minor">
+                <a:schemeClr val="lt1"/>
+              </a:fontRef>
+            </p:style>
+            <p:txBody>
+              <a:bodyPr rtlCol="0" anchor="ctr"/>
+              <a:lstStyle/>
+              <a:p>
+                <a:pPr algn="ctr"/>
+                <a:endParaRPr lang="en-US"/>
+              </a:p>
+            </p:txBody>
+          </p:sp>
+          <p:sp>
+            <p:nvSpPr>
+              <p:cNvPr id="9" name="타원 8"/>
+              <p:cNvSpPr/>
+              <p:nvPr/>
+            </p:nvSpPr>
+            <p:spPr>
+              <a:xfrm>
+                <a:off x="5407953" y="3696810"/>
+                <a:ext cx="333059" cy="333059"/>
+              </a:xfrm>
+              <a:prstGeom prst="ellipse">
+                <a:avLst/>
+              </a:prstGeom>
+              <a:solidFill>
+                <a:srgbClr val="7F7F7F"/>
+              </a:solidFill>
+              <a:ln w="19050">
+                <a:solidFill>
+                  <a:schemeClr val="tx1"/>
+                </a:solidFill>
+              </a:ln>
+            </p:spPr>
+            <p:style>
+              <a:lnRef idx="2">
+                <a:schemeClr val="accent1">
+                  <a:shade val="50000"/>
+                </a:schemeClr>
+              </a:lnRef>
+              <a:fillRef idx="1">
+                <a:schemeClr val="accent1"/>
+              </a:fillRef>
+              <a:effectRef idx="0">
+                <a:schemeClr val="accent1"/>
+              </a:effectRef>
+              <a:fontRef idx="minor">
+                <a:schemeClr val="lt1"/>
+              </a:fontRef>
+            </p:style>
+            <p:txBody>
+              <a:bodyPr rtlCol="0" anchor="ctr"/>
+              <a:lstStyle/>
+              <a:p>
+                <a:pPr algn="ctr"/>
+                <a:endParaRPr lang="en-US"/>
+              </a:p>
+            </p:txBody>
+          </p:sp>
+          <p:sp>
+            <p:nvSpPr>
+              <p:cNvPr id="14" name="직사각형 13"/>
+              <p:cNvSpPr/>
+              <p:nvPr/>
+            </p:nvSpPr>
+            <p:spPr>
+              <a:xfrm>
+                <a:off x="838200" y="3497580"/>
+                <a:ext cx="1043940" cy="833553"/>
+              </a:xfrm>
+              <a:prstGeom prst="rect">
+                <a:avLst/>
+              </a:prstGeom>
+              <a:solidFill>
+                <a:srgbClr val="7F7F7F"/>
+              </a:solidFill>
+              <a:ln w="38100">
+                <a:solidFill>
+                  <a:schemeClr val="tx1"/>
+                </a:solidFill>
+              </a:ln>
+            </p:spPr>
+            <p:style>
+              <a:lnRef idx="2">
+                <a:schemeClr val="accent1">
+                  <a:shade val="50000"/>
+                </a:schemeClr>
+              </a:lnRef>
+              <a:fillRef idx="1">
+                <a:schemeClr val="accent1"/>
+              </a:fillRef>
+              <a:effectRef idx="0">
+                <a:schemeClr val="accent1"/>
+              </a:effectRef>
+              <a:fontRef idx="minor">
+                <a:schemeClr val="lt1"/>
+              </a:fontRef>
+            </p:style>
+            <p:txBody>
+              <a:bodyPr rtlCol="0" anchor="ctr"/>
+              <a:lstStyle/>
+              <a:p>
+                <a:pPr algn="ctr"/>
+                <a:endParaRPr lang="en-US"/>
+              </a:p>
+            </p:txBody>
+          </p:sp>
+          <p:sp>
+            <p:nvSpPr>
+              <p:cNvPr id="18" name="직사각형 17"/>
+              <p:cNvSpPr/>
+              <p:nvPr/>
+            </p:nvSpPr>
+            <p:spPr>
+              <a:xfrm flipH="1">
+                <a:off x="9083040" y="3497580"/>
+                <a:ext cx="1043940" cy="833553"/>
+              </a:xfrm>
+              <a:prstGeom prst="rect">
+                <a:avLst/>
+              </a:prstGeom>
+              <a:solidFill>
+                <a:srgbClr val="7F7F7F"/>
+              </a:solidFill>
+              <a:ln w="38100">
+                <a:solidFill>
+                  <a:schemeClr val="tx1"/>
+                </a:solidFill>
+              </a:ln>
+            </p:spPr>
+            <p:style>
+              <a:lnRef idx="2">
+                <a:schemeClr val="accent1">
+                  <a:shade val="50000"/>
+                </a:schemeClr>
+              </a:lnRef>
+              <a:fillRef idx="1">
+                <a:schemeClr val="accent1"/>
+              </a:fillRef>
+              <a:effectRef idx="0">
+                <a:schemeClr val="accent1"/>
+              </a:effectRef>
+              <a:fontRef idx="minor">
+                <a:schemeClr val="lt1"/>
+              </a:fontRef>
+            </p:style>
+            <p:txBody>
+              <a:bodyPr rtlCol="0" anchor="ctr"/>
+              <a:lstStyle/>
+              <a:p>
+                <a:pPr algn="ctr"/>
+                <a:endParaRPr lang="en-US"/>
+              </a:p>
+            </p:txBody>
+          </p:sp>
+          <p:cxnSp>
+            <p:nvCxnSpPr>
+              <p:cNvPr id="20" name="직선 연결선 19"/>
+              <p:cNvCxnSpPr/>
+              <p:nvPr/>
+            </p:nvCxnSpPr>
+            <p:spPr>
+              <a:xfrm>
+                <a:off x="5574482" y="2049780"/>
+                <a:ext cx="0" cy="3375660"/>
+              </a:xfrm>
+              <a:prstGeom prst="line">
+                <a:avLst/>
+              </a:prstGeom>
+              <a:ln w="28575">
+                <a:solidFill>
+                  <a:schemeClr val="tx1"/>
+                </a:solidFill>
+                <a:prstDash val="sysDot"/>
+              </a:ln>
+            </p:spPr>
+            <p:style>
+              <a:lnRef idx="1">
+                <a:schemeClr val="accent1"/>
+              </a:lnRef>
+              <a:fillRef idx="0">
+                <a:schemeClr val="accent1"/>
+              </a:fillRef>
+              <a:effectRef idx="0">
+                <a:schemeClr val="accent1"/>
+              </a:effectRef>
+              <a:fontRef idx="minor">
+                <a:schemeClr val="tx1"/>
+              </a:fontRef>
+            </p:style>
+          </p:cxnSp>
+          <p:cxnSp>
+            <p:nvCxnSpPr>
+              <p:cNvPr id="23" name="직선 화살표 연결선 22"/>
+              <p:cNvCxnSpPr/>
+              <p:nvPr/>
+            </p:nvCxnSpPr>
+            <p:spPr>
+              <a:xfrm>
+                <a:off x="4458152" y="3322320"/>
+                <a:ext cx="2232660" cy="0"/>
+              </a:xfrm>
+              <a:prstGeom prst="straightConnector1">
+                <a:avLst/>
+              </a:prstGeom>
+              <a:ln w="38100">
+                <a:headEnd type="triangle"/>
+                <a:tailEnd type="triangle"/>
+              </a:ln>
+            </p:spPr>
+            <p:style>
+              <a:lnRef idx="1">
+                <a:schemeClr val="dk1"/>
+              </a:lnRef>
+              <a:fillRef idx="0">
+                <a:schemeClr val="dk1"/>
+              </a:fillRef>
+              <a:effectRef idx="0">
+                <a:schemeClr val="dk1"/>
+              </a:effectRef>
+              <a:fontRef idx="minor">
+                <a:schemeClr val="tx1"/>
+              </a:fontRef>
+            </p:style>
+          </p:cxnSp>
+          <p:grpSp>
+            <p:nvGrpSpPr>
+              <p:cNvPr id="29" name="그룹 28"/>
+              <p:cNvGrpSpPr/>
+              <p:nvPr/>
+            </p:nvGrpSpPr>
+            <p:grpSpPr>
+              <a:xfrm>
+                <a:off x="8286296" y="3621572"/>
+                <a:ext cx="374287" cy="674132"/>
+                <a:chOff x="2484957" y="3552944"/>
+                <a:chExt cx="374287" cy="674132"/>
+              </a:xfrm>
+            </p:grpSpPr>
+            <p:sp>
+              <p:nvSpPr>
+                <p:cNvPr id="30" name="TextBox 29"/>
+                <p:cNvSpPr txBox="1"/>
+                <p:nvPr/>
+              </p:nvSpPr>
+              <p:spPr>
+                <a:xfrm>
+                  <a:off x="2484957" y="3552944"/>
+                  <a:ext cx="374287" cy="369332"/>
+                </a:xfrm>
+                <a:prstGeom prst="rect">
+                  <a:avLst/>
+                </a:prstGeom>
+                <a:noFill/>
+              </p:spPr>
+              <p:txBody>
+                <a:bodyPr wrap="square" rtlCol="0">
+                  <a:spAutoFit/>
+                </a:bodyPr>
+                <a:lstStyle/>
+                <a:p>
+                  <a:r>
+                    <a:rPr lang="en-US" smtClean="0"/>
+                    <a:t>~</a:t>
+                  </a:r>
+                  <a:endParaRPr lang="en-US"/>
+                </a:p>
+              </p:txBody>
+            </p:sp>
+            <p:sp>
+              <p:nvSpPr>
+                <p:cNvPr id="31" name="TextBox 30"/>
+                <p:cNvSpPr txBox="1"/>
+                <p:nvPr/>
+              </p:nvSpPr>
+              <p:spPr>
+                <a:xfrm>
+                  <a:off x="2484957" y="3705344"/>
+                  <a:ext cx="374287" cy="369332"/>
+                </a:xfrm>
+                <a:prstGeom prst="rect">
+                  <a:avLst/>
+                </a:prstGeom>
+                <a:noFill/>
+              </p:spPr>
+              <p:txBody>
+                <a:bodyPr wrap="square" rtlCol="0">
+                  <a:spAutoFit/>
+                </a:bodyPr>
+                <a:lstStyle/>
+                <a:p>
+                  <a:r>
+                    <a:rPr lang="en-US" smtClean="0"/>
+                    <a:t>~</a:t>
+                  </a:r>
+                  <a:endParaRPr lang="en-US"/>
+                </a:p>
+              </p:txBody>
+            </p:sp>
+            <p:sp>
+              <p:nvSpPr>
+                <p:cNvPr id="32" name="TextBox 31"/>
+                <p:cNvSpPr txBox="1"/>
+                <p:nvPr/>
+              </p:nvSpPr>
+              <p:spPr>
+                <a:xfrm>
+                  <a:off x="2484957" y="3857744"/>
+                  <a:ext cx="374287" cy="369332"/>
+                </a:xfrm>
+                <a:prstGeom prst="rect">
+                  <a:avLst/>
+                </a:prstGeom>
+                <a:noFill/>
+              </p:spPr>
+              <p:txBody>
+                <a:bodyPr wrap="square" rtlCol="0">
+                  <a:spAutoFit/>
+                </a:bodyPr>
+                <a:lstStyle/>
+                <a:p>
+                  <a:r>
+                    <a:rPr lang="en-US" smtClean="0"/>
+                    <a:t>~</a:t>
+                  </a:r>
+                  <a:endParaRPr lang="en-US"/>
+                </a:p>
+              </p:txBody>
+            </p:sp>
+          </p:grpSp>
+          <p:sp>
+            <p:nvSpPr>
+              <p:cNvPr id="13" name="타원 12"/>
+              <p:cNvSpPr/>
+              <p:nvPr/>
+            </p:nvSpPr>
+            <p:spPr>
+              <a:xfrm>
+                <a:off x="1475307" y="3505200"/>
+                <a:ext cx="825933" cy="825933"/>
+              </a:xfrm>
+              <a:prstGeom prst="ellipse">
+                <a:avLst/>
+              </a:prstGeom>
+              <a:solidFill>
+                <a:srgbClr val="7F7F7F"/>
+              </a:solidFill>
+              <a:ln w="38100">
+                <a:solidFill>
+                  <a:schemeClr val="tx1"/>
+                </a:solidFill>
+              </a:ln>
+            </p:spPr>
+            <p:style>
+              <a:lnRef idx="2">
+                <a:schemeClr val="accent1">
+                  <a:shade val="50000"/>
+                </a:schemeClr>
+              </a:lnRef>
+              <a:fillRef idx="1">
+                <a:schemeClr val="accent1"/>
+              </a:fillRef>
+              <a:effectRef idx="0">
+                <a:schemeClr val="accent1"/>
+              </a:effectRef>
+              <a:fontRef idx="minor">
+                <a:schemeClr val="lt1"/>
+              </a:fontRef>
+            </p:style>
+            <p:txBody>
+              <a:bodyPr rtlCol="0" anchor="ctr"/>
+              <a:lstStyle/>
+              <a:p>
+                <a:pPr algn="ctr"/>
+                <a:endParaRPr lang="en-US"/>
+              </a:p>
+            </p:txBody>
+          </p:sp>
+          <p:sp>
+            <p:nvSpPr>
+              <p:cNvPr id="17" name="타원 16"/>
+              <p:cNvSpPr/>
+              <p:nvPr/>
+            </p:nvSpPr>
+            <p:spPr>
+              <a:xfrm flipH="1">
+                <a:off x="8663940" y="3505200"/>
+                <a:ext cx="825933" cy="825933"/>
+              </a:xfrm>
+              <a:prstGeom prst="ellipse">
+                <a:avLst/>
+              </a:prstGeom>
+              <a:solidFill>
+                <a:srgbClr val="7F7F7F"/>
+              </a:solidFill>
+              <a:ln w="38100">
+                <a:solidFill>
+                  <a:schemeClr val="tx1"/>
+                </a:solidFill>
+              </a:ln>
+            </p:spPr>
+            <p:style>
+              <a:lnRef idx="2">
+                <a:schemeClr val="accent1">
+                  <a:shade val="50000"/>
+                </a:schemeClr>
+              </a:lnRef>
+              <a:fillRef idx="1">
+                <a:schemeClr val="accent1"/>
+              </a:fillRef>
+              <a:effectRef idx="0">
+                <a:schemeClr val="accent1"/>
+              </a:effectRef>
+              <a:fontRef idx="minor">
+                <a:schemeClr val="lt1"/>
+              </a:fontRef>
+            </p:style>
+            <p:txBody>
+              <a:bodyPr rtlCol="0" anchor="ctr"/>
+              <a:lstStyle/>
+              <a:p>
+                <a:pPr algn="ctr"/>
+                <a:endParaRPr lang="en-US"/>
+              </a:p>
+            </p:txBody>
+          </p:sp>
+          <p:sp>
+            <p:nvSpPr>
+              <p:cNvPr id="33" name="TextBox 32"/>
+              <p:cNvSpPr txBox="1"/>
+              <p:nvPr/>
+            </p:nvSpPr>
+            <p:spPr>
+              <a:xfrm>
+                <a:off x="4568642" y="1973910"/>
+                <a:ext cx="2011680" cy="369332"/>
+              </a:xfrm>
+              <a:prstGeom prst="rect">
+                <a:avLst/>
+              </a:prstGeom>
+              <a:noFill/>
+            </p:spPr>
+            <p:txBody>
+              <a:bodyPr wrap="square" rtlCol="0">
+                <a:spAutoFit/>
+              </a:bodyPr>
+              <a:lstStyle/>
+              <a:p>
+                <a:pPr algn="ctr"/>
+                <a:r>
+                  <a:rPr lang="en-US" smtClean="0"/>
+                  <a:t>1              2</a:t>
+                </a:r>
+                <a:endParaRPr lang="en-US"/>
+              </a:p>
+            </p:txBody>
+          </p:sp>
+        </p:grpSp>
       </p:grpSp>
-      <p:grpSp>
-        <p:nvGrpSpPr>
-          <p:cNvPr id="29" name="그룹 28"/>
-          <p:cNvGrpSpPr/>
-          <p:nvPr/>
-        </p:nvGrpSpPr>
-        <p:grpSpPr>
-          <a:xfrm>
-            <a:off x="8286296" y="3621572"/>
-            <a:ext cx="374287" cy="674132"/>
-            <a:chOff x="2484957" y="3552944"/>
-            <a:chExt cx="374287" cy="674132"/>
-          </a:xfrm>
-        </p:grpSpPr>
-        <p:sp>
-          <p:nvSpPr>
-            <p:cNvPr id="30" name="TextBox 29"/>
-            <p:cNvSpPr txBox="1"/>
-            <p:nvPr/>
-          </p:nvSpPr>
-          <p:spPr>
-            <a:xfrm>
-              <a:off x="2484957" y="3552944"/>
-              <a:ext cx="374287" cy="369332"/>
-            </a:xfrm>
-            <a:prstGeom prst="rect">
-              <a:avLst/>
-            </a:prstGeom>
-            <a:noFill/>
-          </p:spPr>
-          <p:txBody>
-            <a:bodyPr wrap="square" rtlCol="0">
-              <a:spAutoFit/>
-            </a:bodyPr>
-            <a:lstStyle/>
-            <a:p>
-              <a:r>
-                <a:rPr lang="en-US" smtClean="0"/>
-                <a:t>~</a:t>
-              </a:r>
-              <a:endParaRPr lang="en-US"/>
-            </a:p>
-          </p:txBody>
-        </p:sp>
-        <p:sp>
-          <p:nvSpPr>
-            <p:cNvPr id="31" name="TextBox 30"/>
-            <p:cNvSpPr txBox="1"/>
-            <p:nvPr/>
-          </p:nvSpPr>
-          <p:spPr>
-            <a:xfrm>
-              <a:off x="2484957" y="3705344"/>
-              <a:ext cx="374287" cy="369332"/>
-            </a:xfrm>
-            <a:prstGeom prst="rect">
-              <a:avLst/>
-            </a:prstGeom>
-            <a:noFill/>
-          </p:spPr>
-          <p:txBody>
-            <a:bodyPr wrap="square" rtlCol="0">
-              <a:spAutoFit/>
-            </a:bodyPr>
-            <a:lstStyle/>
-            <a:p>
-              <a:r>
-                <a:rPr lang="en-US" smtClean="0"/>
-                <a:t>~</a:t>
-              </a:r>
-              <a:endParaRPr lang="en-US"/>
-            </a:p>
-          </p:txBody>
-        </p:sp>
-        <p:sp>
-          <p:nvSpPr>
-            <p:cNvPr id="32" name="TextBox 31"/>
-            <p:cNvSpPr txBox="1"/>
-            <p:nvPr/>
-          </p:nvSpPr>
-          <p:spPr>
-            <a:xfrm>
-              <a:off x="2484957" y="3857744"/>
-              <a:ext cx="374287" cy="369332"/>
-            </a:xfrm>
-            <a:prstGeom prst="rect">
-              <a:avLst/>
-            </a:prstGeom>
-            <a:noFill/>
-          </p:spPr>
-          <p:txBody>
-            <a:bodyPr wrap="square" rtlCol="0">
-              <a:spAutoFit/>
-            </a:bodyPr>
-            <a:lstStyle/>
-            <a:p>
-              <a:r>
-                <a:rPr lang="en-US" smtClean="0"/>
-                <a:t>~</a:t>
-              </a:r>
-              <a:endParaRPr lang="en-US"/>
-            </a:p>
-          </p:txBody>
-        </p:sp>
-      </p:grpSp>
-      <p:sp>
-        <p:nvSpPr>
-          <p:cNvPr id="13" name="타원 12"/>
-          <p:cNvSpPr/>
-          <p:nvPr/>
-        </p:nvSpPr>
-        <p:spPr>
-          <a:xfrm>
-            <a:off x="1475307" y="3505200"/>
-            <a:ext cx="825933" cy="825933"/>
-          </a:xfrm>
-          <a:prstGeom prst="ellipse">
-            <a:avLst/>
-          </a:prstGeom>
-          <a:solidFill>
-            <a:srgbClr val="7F7F7F"/>
-          </a:solidFill>
-          <a:ln w="38100">
-            <a:solidFill>
-              <a:schemeClr val="tx1"/>
-            </a:solidFill>
-          </a:ln>
-        </p:spPr>
-        <p:style>
-          <a:lnRef idx="2">
-            <a:schemeClr val="accent1">
-              <a:shade val="50000"/>
-            </a:schemeClr>
-          </a:lnRef>
-          <a:fillRef idx="1">
-            <a:schemeClr val="accent1"/>
-          </a:fillRef>
-          <a:effectRef idx="0">
-            <a:schemeClr val="accent1"/>
-          </a:effectRef>
-          <a:fontRef idx="minor">
-            <a:schemeClr val="lt1"/>
-          </a:fontRef>
-        </p:style>
-        <p:txBody>
-          <a:bodyPr rtlCol="0" anchor="ctr"/>
-          <a:lstStyle/>
-          <a:p>
-            <a:pPr algn="ctr"/>
-            <a:endParaRPr lang="en-US"/>
-          </a:p>
-        </p:txBody>
-      </p:sp>
-      <p:sp>
-        <p:nvSpPr>
-          <p:cNvPr id="17" name="타원 16"/>
-          <p:cNvSpPr/>
-          <p:nvPr/>
-        </p:nvSpPr>
-        <p:spPr>
-          <a:xfrm flipH="1">
-            <a:off x="8663940" y="3505200"/>
-            <a:ext cx="825933" cy="825933"/>
-          </a:xfrm>
-          <a:prstGeom prst="ellipse">
-            <a:avLst/>
-          </a:prstGeom>
-          <a:solidFill>
-            <a:srgbClr val="7F7F7F"/>
-          </a:solidFill>
-          <a:ln w="38100">
-            <a:solidFill>
-              <a:schemeClr val="tx1"/>
-            </a:solidFill>
-          </a:ln>
-        </p:spPr>
-        <p:style>
-          <a:lnRef idx="2">
-            <a:schemeClr val="accent1">
-              <a:shade val="50000"/>
-            </a:schemeClr>
-          </a:lnRef>
-          <a:fillRef idx="1">
-            <a:schemeClr val="accent1"/>
-          </a:fillRef>
-          <a:effectRef idx="0">
-            <a:schemeClr val="accent1"/>
-          </a:effectRef>
-          <a:fontRef idx="minor">
-            <a:schemeClr val="lt1"/>
-          </a:fontRef>
-        </p:style>
-        <p:txBody>
-          <a:bodyPr rtlCol="0" anchor="ctr"/>
-          <a:lstStyle/>
-          <a:p>
-            <a:pPr algn="ctr"/>
-            <a:endParaRPr lang="en-US"/>
-          </a:p>
-        </p:txBody>
-      </p:sp>
-      <p:sp>
-        <p:nvSpPr>
-          <p:cNvPr id="33" name="TextBox 32"/>
-          <p:cNvSpPr txBox="1"/>
-          <p:nvPr/>
-        </p:nvSpPr>
-        <p:spPr>
-          <a:xfrm>
-            <a:off x="4568642" y="1973910"/>
-            <a:ext cx="2011680" cy="369332"/>
-          </a:xfrm>
-          <a:prstGeom prst="rect">
-            <a:avLst/>
-          </a:prstGeom>
-          <a:noFill/>
-        </p:spPr>
-        <p:txBody>
-          <a:bodyPr wrap="square" rtlCol="0">
-            <a:spAutoFit/>
-          </a:bodyPr>
-          <a:lstStyle/>
-          <a:p>
-            <a:pPr algn="ctr"/>
-            <a:r>
-              <a:rPr lang="en-US" smtClean="0"/>
-              <a:t>1              2</a:t>
-            </a:r>
-            <a:endParaRPr lang="en-US"/>
-          </a:p>
-        </p:txBody>
-      </p:sp>
       <p:sp>
         <p:nvSpPr>
           <p:cNvPr id="34" name="TextBox 33"/>
@@ -6653,139 +6678,58 @@
           <a:lstStyle/>
           <a:p>
             <a:r>
-              <a:rPr lang="ko-KR" altLang="en-US" smtClean="0">
+              <a:rPr lang="en-US" altLang="ko-KR">
                 <a:latin typeface="나눔스퀘어 Bold" panose="020B0600000101010101" pitchFamily="50" charset="-127"/>
                 <a:ea typeface="나눔스퀘어 Bold" panose="020B0600000101010101" pitchFamily="50" charset="-127"/>
               </a:rPr>
-              <a:t>공이 </a:t>
+              <a:t>When the ball is in 1, the fan 1 turns on and the fan 2 turns off. If the ball is at 2, the </a:t>
+            </a:r>
+            <a:r>
+              <a:rPr lang="en-US" altLang="ko-KR">
+                <a:latin typeface="나눔스퀘어 Bold" panose="020B0600000101010101" pitchFamily="50" charset="-127"/>
+                <a:ea typeface="나눔스퀘어 Bold" panose="020B0600000101010101" pitchFamily="50" charset="-127"/>
+              </a:rPr>
+              <a:t>fan </a:t>
             </a:r>
             <a:r>
               <a:rPr lang="en-US" altLang="ko-KR" smtClean="0">
                 <a:latin typeface="나눔스퀘어 Bold" panose="020B0600000101010101" pitchFamily="50" charset="-127"/>
                 <a:ea typeface="나눔스퀘어 Bold" panose="020B0600000101010101" pitchFamily="50" charset="-127"/>
               </a:rPr>
-              <a:t>1</a:t>
+              <a:t>2 </a:t>
             </a:r>
             <a:r>
-              <a:rPr lang="ko-KR" altLang="en-US" smtClean="0">
+              <a:rPr lang="en-US" altLang="ko-KR">
                 <a:latin typeface="나눔스퀘어 Bold" panose="020B0600000101010101" pitchFamily="50" charset="-127"/>
                 <a:ea typeface="나눔스퀘어 Bold" panose="020B0600000101010101" pitchFamily="50" charset="-127"/>
               </a:rPr>
-              <a:t>에 있으면 </a:t>
+              <a:t>turns on and </a:t>
+            </a:r>
+            <a:r>
+              <a:rPr lang="en-US" altLang="ko-KR">
+                <a:latin typeface="나눔스퀘어 Bold" panose="020B0600000101010101" pitchFamily="50" charset="-127"/>
+                <a:ea typeface="나눔스퀘어 Bold" panose="020B0600000101010101" pitchFamily="50" charset="-127"/>
+              </a:rPr>
+              <a:t>the </a:t>
             </a:r>
             <a:r>
               <a:rPr lang="en-US" altLang="ko-KR" smtClean="0">
                 <a:latin typeface="나눔스퀘어 Bold" panose="020B0600000101010101" pitchFamily="50" charset="-127"/>
                 <a:ea typeface="나눔스퀘어 Bold" panose="020B0600000101010101" pitchFamily="50" charset="-127"/>
               </a:rPr>
-              <a:t>1</a:t>
+              <a:t>fan 1 </a:t>
             </a:r>
             <a:r>
-              <a:rPr lang="ko-KR" altLang="en-US" smtClean="0">
+              <a:rPr lang="en-US" altLang="ko-KR">
                 <a:latin typeface="나눔스퀘어 Bold" panose="020B0600000101010101" pitchFamily="50" charset="-127"/>
                 <a:ea typeface="나눔스퀘어 Bold" panose="020B0600000101010101" pitchFamily="50" charset="-127"/>
               </a:rPr>
-              <a:t>의 선풍기가 켜지고 </a:t>
+              <a:t>turns off. The ball moves from side to side and falls down when the wind strength is greater than a certain amount.</a:t>
             </a:r>
-            <a:r>
-              <a:rPr lang="en-US" altLang="ko-KR" smtClean="0">
-                <a:latin typeface="나눔스퀘어 Bold" panose="020B0600000101010101" pitchFamily="50" charset="-127"/>
-                <a:ea typeface="나눔스퀘어 Bold" panose="020B0600000101010101" pitchFamily="50" charset="-127"/>
-              </a:rPr>
-              <a:t>2</a:t>
-            </a:r>
-            <a:r>
-              <a:rPr lang="ko-KR" altLang="en-US" smtClean="0">
-                <a:latin typeface="나눔스퀘어 Bold" panose="020B0600000101010101" pitchFamily="50" charset="-127"/>
-                <a:ea typeface="나눔스퀘어 Bold" panose="020B0600000101010101" pitchFamily="50" charset="-127"/>
-              </a:rPr>
-              <a:t>의 선풍기가 꺼진다</a:t>
-            </a:r>
-            <a:r>
-              <a:rPr lang="en-US" altLang="ko-KR" smtClean="0">
-                <a:latin typeface="나눔스퀘어 Bold" panose="020B0600000101010101" pitchFamily="50" charset="-127"/>
-                <a:ea typeface="나눔스퀘어 Bold" panose="020B0600000101010101" pitchFamily="50" charset="-127"/>
-              </a:rPr>
-              <a:t>.</a:t>
-            </a:r>
-          </a:p>
-          <a:p>
-            <a:r>
-              <a:rPr lang="ko-KR" altLang="en-US" smtClean="0">
-                <a:latin typeface="나눔스퀘어 Bold" panose="020B0600000101010101" pitchFamily="50" charset="-127"/>
-                <a:ea typeface="나눔스퀘어 Bold" panose="020B0600000101010101" pitchFamily="50" charset="-127"/>
-              </a:rPr>
-              <a:t>공이 </a:t>
-            </a:r>
-            <a:r>
-              <a:rPr lang="en-US" altLang="ko-KR" smtClean="0">
-                <a:latin typeface="나눔스퀘어 Bold" panose="020B0600000101010101" pitchFamily="50" charset="-127"/>
-                <a:ea typeface="나눔스퀘어 Bold" panose="020B0600000101010101" pitchFamily="50" charset="-127"/>
-              </a:rPr>
-              <a:t>2</a:t>
-            </a:r>
-            <a:r>
-              <a:rPr lang="ko-KR" altLang="en-US" smtClean="0">
-                <a:latin typeface="나눔스퀘어 Bold" panose="020B0600000101010101" pitchFamily="50" charset="-127"/>
-                <a:ea typeface="나눔스퀘어 Bold" panose="020B0600000101010101" pitchFamily="50" charset="-127"/>
-              </a:rPr>
-              <a:t>에 있으면 </a:t>
-            </a:r>
-            <a:r>
-              <a:rPr lang="en-US" altLang="ko-KR" smtClean="0">
-                <a:latin typeface="나눔스퀘어 Bold" panose="020B0600000101010101" pitchFamily="50" charset="-127"/>
-                <a:ea typeface="나눔스퀘어 Bold" panose="020B0600000101010101" pitchFamily="50" charset="-127"/>
-              </a:rPr>
-              <a:t>2</a:t>
-            </a:r>
-            <a:r>
-              <a:rPr lang="ko-KR" altLang="en-US" smtClean="0">
-                <a:latin typeface="나눔스퀘어 Bold" panose="020B0600000101010101" pitchFamily="50" charset="-127"/>
-                <a:ea typeface="나눔스퀘어 Bold" panose="020B0600000101010101" pitchFamily="50" charset="-127"/>
-              </a:rPr>
-              <a:t>의 선풍기카 켜지고 </a:t>
-            </a:r>
-            <a:r>
-              <a:rPr lang="en-US" altLang="ko-KR" smtClean="0">
-                <a:latin typeface="나눔스퀘어 Bold" panose="020B0600000101010101" pitchFamily="50" charset="-127"/>
-                <a:ea typeface="나눔스퀘어 Bold" panose="020B0600000101010101" pitchFamily="50" charset="-127"/>
-              </a:rPr>
-              <a:t>1</a:t>
-            </a:r>
-            <a:r>
-              <a:rPr lang="ko-KR" altLang="en-US" smtClean="0">
-                <a:latin typeface="나눔스퀘어 Bold" panose="020B0600000101010101" pitchFamily="50" charset="-127"/>
-                <a:ea typeface="나눔스퀘어 Bold" panose="020B0600000101010101" pitchFamily="50" charset="-127"/>
-              </a:rPr>
-              <a:t>의 선풍기가 꺼진다</a:t>
-            </a:r>
-            <a:r>
-              <a:rPr lang="en-US" altLang="ko-KR" smtClean="0">
-                <a:latin typeface="나눔스퀘어 Bold" panose="020B0600000101010101" pitchFamily="50" charset="-127"/>
-                <a:ea typeface="나눔스퀘어 Bold" panose="020B0600000101010101" pitchFamily="50" charset="-127"/>
-              </a:rPr>
-              <a:t>.</a:t>
-            </a:r>
-            <a:br>
-              <a:rPr lang="en-US" altLang="ko-KR" smtClean="0">
-                <a:latin typeface="나눔스퀘어 Bold" panose="020B0600000101010101" pitchFamily="50" charset="-127"/>
-                <a:ea typeface="나눔스퀘어 Bold" panose="020B0600000101010101" pitchFamily="50" charset="-127"/>
-              </a:rPr>
-            </a:br>
-            <a:r>
-              <a:rPr lang="ko-KR" altLang="en-US" smtClean="0">
-                <a:latin typeface="나눔스퀘어 Bold" panose="020B0600000101010101" pitchFamily="50" charset="-127"/>
-                <a:ea typeface="나눔스퀘어 Bold" panose="020B0600000101010101" pitchFamily="50" charset="-127"/>
-              </a:rPr>
-              <a:t>공은 좌우로 움직이다가 바람의 세기가 일정량보다 세지면 아래로 떨어지게 된다</a:t>
-            </a:r>
-            <a:r>
-              <a:rPr lang="en-US" altLang="ko-KR" smtClean="0">
-                <a:latin typeface="나눔스퀘어 Bold" panose="020B0600000101010101" pitchFamily="50" charset="-127"/>
-                <a:ea typeface="나눔스퀘어 Bold" panose="020B0600000101010101" pitchFamily="50" charset="-127"/>
-              </a:rPr>
-              <a:t>.</a:t>
-            </a:r>
+            <a:endParaRPr lang="en-US" altLang="ko-KR" smtClean="0">
+              <a:latin typeface="나눔스퀘어 Bold" panose="020B0600000101010101" pitchFamily="50" charset="-127"/>
+              <a:ea typeface="나눔스퀘어 Bold" panose="020B0600000101010101" pitchFamily="50" charset="-127"/>
+            </a:endParaRPr>
           </a:p>
         </p:txBody>
       </p:sp>
@@ -6828,325 +6772,6 @@
       </p:grpSpPr>
       <p:sp>
         <p:nvSpPr>
-          <p:cNvPr id="51" name="자유형 50"/>
-          <p:cNvSpPr/>
-          <p:nvPr/>
-        </p:nvSpPr>
-        <p:spPr>
-          <a:xfrm>
-            <a:off x="1569723" y="3360420"/>
-            <a:ext cx="9776458" cy="2750820"/>
-          </a:xfrm>
-          <a:custGeom>
-            <a:avLst/>
-            <a:gdLst>
-              <a:gd name="connsiteX0" fmla="*/ 0 w 9776458"/>
-              <a:gd name="connsiteY0" fmla="*/ 0 h 2750820"/>
-              <a:gd name="connsiteX1" fmla="*/ 1638298 w 9776458"/>
-              <a:gd name="connsiteY1" fmla="*/ 0 h 2750820"/>
-              <a:gd name="connsiteX2" fmla="*/ 1638298 w 9776458"/>
-              <a:gd name="connsiteY2" fmla="*/ 1668780 h 2750820"/>
-              <a:gd name="connsiteX3" fmla="*/ 1638673 w 9776458"/>
-              <a:gd name="connsiteY3" fmla="*/ 1668780 h 2750820"/>
-              <a:gd name="connsiteX4" fmla="*/ 1638298 w 9776458"/>
-              <a:gd name="connsiteY4" fmla="*/ 1672500 h 2750820"/>
-              <a:gd name="connsiteX5" fmla="*/ 2358298 w 9776458"/>
-              <a:gd name="connsiteY5" fmla="*/ 2392500 h 2750820"/>
-              <a:gd name="connsiteX6" fmla="*/ 3078297 w 9776458"/>
-              <a:gd name="connsiteY6" fmla="*/ 1672500 h 2750820"/>
-              <a:gd name="connsiteX7" fmla="*/ 3077922 w 9776458"/>
-              <a:gd name="connsiteY7" fmla="*/ 1668780 h 2750820"/>
-              <a:gd name="connsiteX8" fmla="*/ 3078297 w 9776458"/>
-              <a:gd name="connsiteY8" fmla="*/ 1668780 h 2750820"/>
-              <a:gd name="connsiteX9" fmla="*/ 3078297 w 9776458"/>
-              <a:gd name="connsiteY9" fmla="*/ 0 h 2750820"/>
-              <a:gd name="connsiteX10" fmla="*/ 4499607 w 9776458"/>
-              <a:gd name="connsiteY10" fmla="*/ 0 h 2750820"/>
-              <a:gd name="connsiteX11" fmla="*/ 4499607 w 9776458"/>
-              <a:gd name="connsiteY11" fmla="*/ 1668780 h 2750820"/>
-              <a:gd name="connsiteX12" fmla="*/ 4499982 w 9776458"/>
-              <a:gd name="connsiteY12" fmla="*/ 1668780 h 2750820"/>
-              <a:gd name="connsiteX13" fmla="*/ 4499607 w 9776458"/>
-              <a:gd name="connsiteY13" fmla="*/ 1672500 h 2750820"/>
-              <a:gd name="connsiteX14" fmla="*/ 5219607 w 9776458"/>
-              <a:gd name="connsiteY14" fmla="*/ 2392500 h 2750820"/>
-              <a:gd name="connsiteX15" fmla="*/ 5939607 w 9776458"/>
-              <a:gd name="connsiteY15" fmla="*/ 1672500 h 2750820"/>
-              <a:gd name="connsiteX16" fmla="*/ 5939232 w 9776458"/>
-              <a:gd name="connsiteY16" fmla="*/ 1668780 h 2750820"/>
-              <a:gd name="connsiteX17" fmla="*/ 5939607 w 9776458"/>
-              <a:gd name="connsiteY17" fmla="*/ 1668780 h 2750820"/>
-              <a:gd name="connsiteX18" fmla="*/ 5939607 w 9776458"/>
-              <a:gd name="connsiteY18" fmla="*/ 0 h 2750820"/>
-              <a:gd name="connsiteX19" fmla="*/ 7360917 w 9776458"/>
-              <a:gd name="connsiteY19" fmla="*/ 0 h 2750820"/>
-              <a:gd name="connsiteX20" fmla="*/ 7360917 w 9776458"/>
-              <a:gd name="connsiteY20" fmla="*/ 1668780 h 2750820"/>
-              <a:gd name="connsiteX21" fmla="*/ 7361292 w 9776458"/>
-              <a:gd name="connsiteY21" fmla="*/ 1668780 h 2750820"/>
-              <a:gd name="connsiteX22" fmla="*/ 7360917 w 9776458"/>
-              <a:gd name="connsiteY22" fmla="*/ 1672500 h 2750820"/>
-              <a:gd name="connsiteX23" fmla="*/ 8080917 w 9776458"/>
-              <a:gd name="connsiteY23" fmla="*/ 2392500 h 2750820"/>
-              <a:gd name="connsiteX24" fmla="*/ 8800917 w 9776458"/>
-              <a:gd name="connsiteY24" fmla="*/ 1672500 h 2750820"/>
-              <a:gd name="connsiteX25" fmla="*/ 8800542 w 9776458"/>
-              <a:gd name="connsiteY25" fmla="*/ 1668780 h 2750820"/>
-              <a:gd name="connsiteX26" fmla="*/ 8800917 w 9776458"/>
-              <a:gd name="connsiteY26" fmla="*/ 1668780 h 2750820"/>
-              <a:gd name="connsiteX27" fmla="*/ 8800917 w 9776458"/>
-              <a:gd name="connsiteY27" fmla="*/ 0 h 2750820"/>
-              <a:gd name="connsiteX28" fmla="*/ 9776458 w 9776458"/>
-              <a:gd name="connsiteY28" fmla="*/ 0 h 2750820"/>
-              <a:gd name="connsiteX29" fmla="*/ 9776458 w 9776458"/>
-              <a:gd name="connsiteY29" fmla="*/ 2750820 h 2750820"/>
-              <a:gd name="connsiteX30" fmla="*/ 0 w 9776458"/>
-              <a:gd name="connsiteY30" fmla="*/ 2750820 h 2750820"/>
-            </a:gdLst>
-            <a:ahLst/>
-            <a:cxnLst>
-              <a:cxn ang="0">
-                <a:pos x="connsiteX0" y="connsiteY0"/>
-              </a:cxn>
-              <a:cxn ang="0">
-                <a:pos x="connsiteX1" y="connsiteY1"/>
-              </a:cxn>
-              <a:cxn ang="0">
-                <a:pos x="connsiteX2" y="connsiteY2"/>
-              </a:cxn>
-              <a:cxn ang="0">
-                <a:pos x="connsiteX3" y="connsiteY3"/>
-              </a:cxn>
-              <a:cxn ang="0">
-                <a:pos x="connsiteX4" y="connsiteY4"/>
-              </a:cxn>
-              <a:cxn ang="0">
-                <a:pos x="connsiteX5" y="connsiteY5"/>
-              </a:cxn>
-              <a:cxn ang="0">
-                <a:pos x="connsiteX6" y="connsiteY6"/>
-              </a:cxn>
-              <a:cxn ang="0">
-                <a:pos x="connsiteX7" y="connsiteY7"/>
-              </a:cxn>
-              <a:cxn ang="0">
-                <a:pos x="connsiteX8" y="connsiteY8"/>
-              </a:cxn>
-              <a:cxn ang="0">
-                <a:pos x="connsiteX9" y="connsiteY9"/>
-              </a:cxn>
-              <a:cxn ang="0">
-                <a:pos x="connsiteX10" y="connsiteY10"/>
-              </a:cxn>
-              <a:cxn ang="0">
-                <a:pos x="connsiteX11" y="connsiteY11"/>
-              </a:cxn>
-              <a:cxn ang="0">
-                <a:pos x="connsiteX12" y="connsiteY12"/>
-              </a:cxn>
-              <a:cxn ang="0">
-                <a:pos x="connsiteX13" y="connsiteY13"/>
-              </a:cxn>
-              <a:cxn ang="0">
-                <a:pos x="connsiteX14" y="connsiteY14"/>
-              </a:cxn>
-              <a:cxn ang="0">
-                <a:pos x="connsiteX15" y="connsiteY15"/>
-              </a:cxn>
-              <a:cxn ang="0">
-                <a:pos x="connsiteX16" y="connsiteY16"/>
-              </a:cxn>
-              <a:cxn ang="0">
-                <a:pos x="connsiteX17" y="connsiteY17"/>
-              </a:cxn>
-              <a:cxn ang="0">
-                <a:pos x="connsiteX18" y="connsiteY18"/>
-              </a:cxn>
-              <a:cxn ang="0">
-                <a:pos x="connsiteX19" y="connsiteY19"/>
-              </a:cxn>
-              <a:cxn ang="0">
-                <a:pos x="connsiteX20" y="connsiteY20"/>
-              </a:cxn>
-              <a:cxn ang="0">
-                <a:pos x="connsiteX21" y="connsiteY21"/>
-              </a:cxn>
-              <a:cxn ang="0">
-                <a:pos x="connsiteX22" y="connsiteY22"/>
-              </a:cxn>
-              <a:cxn ang="0">
-                <a:pos x="connsiteX23" y="connsiteY23"/>
-              </a:cxn>
-              <a:cxn ang="0">
-                <a:pos x="connsiteX24" y="connsiteY24"/>
-              </a:cxn>
-              <a:cxn ang="0">
-                <a:pos x="connsiteX25" y="connsiteY25"/>
-              </a:cxn>
-              <a:cxn ang="0">
-                <a:pos x="connsiteX26" y="connsiteY26"/>
-              </a:cxn>
-              <a:cxn ang="0">
-                <a:pos x="connsiteX27" y="connsiteY27"/>
-              </a:cxn>
-              <a:cxn ang="0">
-                <a:pos x="connsiteX28" y="connsiteY28"/>
-              </a:cxn>
-              <a:cxn ang="0">
-                <a:pos x="connsiteX29" y="connsiteY29"/>
-              </a:cxn>
-              <a:cxn ang="0">
-                <a:pos x="connsiteX30" y="connsiteY30"/>
-              </a:cxn>
-            </a:cxnLst>
-            <a:rect l="l" t="t" r="r" b="b"/>
-            <a:pathLst>
-              <a:path w="9776458" h="2750820">
-                <a:moveTo>
-                  <a:pt x="0" y="0"/>
-                </a:moveTo>
-                <a:lnTo>
-                  <a:pt x="1638298" y="0"/>
-                </a:lnTo>
-                <a:lnTo>
-                  <a:pt x="1638298" y="1668780"/>
-                </a:lnTo>
-                <a:lnTo>
-                  <a:pt x="1638673" y="1668780"/>
-                </a:lnTo>
-                <a:lnTo>
-                  <a:pt x="1638298" y="1672500"/>
-                </a:lnTo>
-                <a:cubicBezTo>
-                  <a:pt x="1638298" y="2070145"/>
-                  <a:pt x="1960653" y="2392500"/>
-                  <a:pt x="2358298" y="2392500"/>
-                </a:cubicBezTo>
-                <a:cubicBezTo>
-                  <a:pt x="2755942" y="2392500"/>
-                  <a:pt x="3078297" y="2070145"/>
-                  <a:pt x="3078297" y="1672500"/>
-                </a:cubicBezTo>
-                <a:lnTo>
-                  <a:pt x="3077922" y="1668780"/>
-                </a:lnTo>
-                <a:lnTo>
-                  <a:pt x="3078297" y="1668780"/>
-                </a:lnTo>
-                <a:lnTo>
-                  <a:pt x="3078297" y="0"/>
-                </a:lnTo>
-                <a:lnTo>
-                  <a:pt x="4499607" y="0"/>
-                </a:lnTo>
-                <a:lnTo>
-                  <a:pt x="4499607" y="1668780"/>
-                </a:lnTo>
-                <a:lnTo>
-                  <a:pt x="4499982" y="1668780"/>
-                </a:lnTo>
-                <a:lnTo>
-                  <a:pt x="4499607" y="1672500"/>
-                </a:lnTo>
-                <a:cubicBezTo>
-                  <a:pt x="4499607" y="2070145"/>
-                  <a:pt x="4821962" y="2392500"/>
-                  <a:pt x="5219607" y="2392500"/>
-                </a:cubicBezTo>
-                <a:cubicBezTo>
-                  <a:pt x="5617252" y="2392500"/>
-                  <a:pt x="5939607" y="2070145"/>
-                  <a:pt x="5939607" y="1672500"/>
-                </a:cubicBezTo>
-                <a:lnTo>
-                  <a:pt x="5939232" y="1668780"/>
-                </a:lnTo>
-                <a:lnTo>
-                  <a:pt x="5939607" y="1668780"/>
-                </a:lnTo>
-                <a:lnTo>
-                  <a:pt x="5939607" y="0"/>
-                </a:lnTo>
-                <a:lnTo>
-                  <a:pt x="7360917" y="0"/>
-                </a:lnTo>
-                <a:lnTo>
-                  <a:pt x="7360917" y="1668780"/>
-                </a:lnTo>
-                <a:lnTo>
-                  <a:pt x="7361292" y="1668780"/>
-                </a:lnTo>
-                <a:lnTo>
-                  <a:pt x="7360917" y="1672500"/>
-                </a:lnTo>
-                <a:cubicBezTo>
-                  <a:pt x="7360917" y="2070145"/>
-                  <a:pt x="7683272" y="2392500"/>
-                  <a:pt x="8080917" y="2392500"/>
-                </a:cubicBezTo>
-                <a:cubicBezTo>
-                  <a:pt x="8478562" y="2392500"/>
-                  <a:pt x="8800917" y="2070145"/>
-                  <a:pt x="8800917" y="1672500"/>
-                </a:cubicBezTo>
-                <a:lnTo>
-                  <a:pt x="8800542" y="1668780"/>
-                </a:lnTo>
-                <a:lnTo>
-                  <a:pt x="8800917" y="1668780"/>
-                </a:lnTo>
-                <a:lnTo>
-                  <a:pt x="8800917" y="0"/>
-                </a:lnTo>
-                <a:lnTo>
-                  <a:pt x="9776458" y="0"/>
-                </a:lnTo>
-                <a:lnTo>
-                  <a:pt x="9776458" y="2750820"/>
-                </a:lnTo>
-                <a:lnTo>
-                  <a:pt x="0" y="2750820"/>
-                </a:lnTo>
-                <a:close/>
-              </a:path>
-            </a:pathLst>
-          </a:custGeom>
-          <a:solidFill>
-            <a:srgbClr val="7F7F7F"/>
-          </a:solidFill>
-          <a:ln w="28575">
-            <a:solidFill>
-              <a:schemeClr val="tx1"/>
-            </a:solidFill>
-          </a:ln>
-        </p:spPr>
-        <p:style>
-          <a:lnRef idx="2">
-            <a:schemeClr val="accent1">
-              <a:shade val="50000"/>
-            </a:schemeClr>
-          </a:lnRef>
-          <a:fillRef idx="1">
-            <a:schemeClr val="accent1"/>
-          </a:fillRef>
-          <a:effectRef idx="0">
-            <a:schemeClr val="accent1"/>
-          </a:effectRef>
-          <a:fontRef idx="minor">
-            <a:schemeClr val="lt1"/>
-          </a:fontRef>
-        </p:style>
-        <p:txBody>
-          <a:bodyPr rtlCol="0" anchor="ctr"/>
-          <a:lstStyle/>
-          <a:p>
-            <a:pPr algn="ctr"/>
-            <a:endParaRPr lang="en-US"/>
-          </a:p>
-        </p:txBody>
-      </p:sp>
-      <p:sp>
-        <p:nvSpPr>
           <p:cNvPr id="2" name="제목 1"/>
           <p:cNvSpPr>
             <a:spLocks noGrp="1"/>
@@ -7181,375 +6806,709 @@
           </a:p>
         </p:txBody>
       </p:sp>
-      <p:sp>
-        <p:nvSpPr>
-          <p:cNvPr id="12" name="직사각형 11"/>
-          <p:cNvSpPr/>
+      <p:grpSp>
+        <p:nvGrpSpPr>
+          <p:cNvPr id="4" name="그룹 3"/>
+          <p:cNvGrpSpPr/>
           <p:nvPr/>
-        </p:nvSpPr>
-        <p:spPr>
-          <a:xfrm rot="19238228">
-            <a:off x="3800872" y="2933703"/>
-            <a:ext cx="937260" cy="228600"/>
+        </p:nvGrpSpPr>
+        <p:grpSpPr>
+          <a:xfrm>
+            <a:off x="1207771" y="2876928"/>
+            <a:ext cx="9776458" cy="3234312"/>
+            <a:chOff x="1569723" y="2876928"/>
+            <a:chExt cx="9776458" cy="3234312"/>
           </a:xfrm>
-          <a:prstGeom prst="rect">
-            <a:avLst/>
-          </a:prstGeom>
-          <a:solidFill>
-            <a:srgbClr val="7F7F7F"/>
-          </a:solidFill>
-          <a:ln w="28575">
+        </p:grpSpPr>
+        <p:sp>
+          <p:nvSpPr>
+            <p:cNvPr id="51" name="자유형 50"/>
+            <p:cNvSpPr/>
+            <p:nvPr/>
+          </p:nvSpPr>
+          <p:spPr>
+            <a:xfrm>
+              <a:off x="1569723" y="3360420"/>
+              <a:ext cx="9776458" cy="2750820"/>
+            </a:xfrm>
+            <a:custGeom>
+              <a:avLst/>
+              <a:gdLst>
+                <a:gd name="connsiteX0" fmla="*/ 0 w 9776458"/>
+                <a:gd name="connsiteY0" fmla="*/ 0 h 2750820"/>
+                <a:gd name="connsiteX1" fmla="*/ 1638298 w 9776458"/>
+                <a:gd name="connsiteY1" fmla="*/ 0 h 2750820"/>
+                <a:gd name="connsiteX2" fmla="*/ 1638298 w 9776458"/>
+                <a:gd name="connsiteY2" fmla="*/ 1668780 h 2750820"/>
+                <a:gd name="connsiteX3" fmla="*/ 1638673 w 9776458"/>
+                <a:gd name="connsiteY3" fmla="*/ 1668780 h 2750820"/>
+                <a:gd name="connsiteX4" fmla="*/ 1638298 w 9776458"/>
+                <a:gd name="connsiteY4" fmla="*/ 1672500 h 2750820"/>
+                <a:gd name="connsiteX5" fmla="*/ 2358298 w 9776458"/>
+                <a:gd name="connsiteY5" fmla="*/ 2392500 h 2750820"/>
+                <a:gd name="connsiteX6" fmla="*/ 3078297 w 9776458"/>
+                <a:gd name="connsiteY6" fmla="*/ 1672500 h 2750820"/>
+                <a:gd name="connsiteX7" fmla="*/ 3077922 w 9776458"/>
+                <a:gd name="connsiteY7" fmla="*/ 1668780 h 2750820"/>
+                <a:gd name="connsiteX8" fmla="*/ 3078297 w 9776458"/>
+                <a:gd name="connsiteY8" fmla="*/ 1668780 h 2750820"/>
+                <a:gd name="connsiteX9" fmla="*/ 3078297 w 9776458"/>
+                <a:gd name="connsiteY9" fmla="*/ 0 h 2750820"/>
+                <a:gd name="connsiteX10" fmla="*/ 4499607 w 9776458"/>
+                <a:gd name="connsiteY10" fmla="*/ 0 h 2750820"/>
+                <a:gd name="connsiteX11" fmla="*/ 4499607 w 9776458"/>
+                <a:gd name="connsiteY11" fmla="*/ 1668780 h 2750820"/>
+                <a:gd name="connsiteX12" fmla="*/ 4499982 w 9776458"/>
+                <a:gd name="connsiteY12" fmla="*/ 1668780 h 2750820"/>
+                <a:gd name="connsiteX13" fmla="*/ 4499607 w 9776458"/>
+                <a:gd name="connsiteY13" fmla="*/ 1672500 h 2750820"/>
+                <a:gd name="connsiteX14" fmla="*/ 5219607 w 9776458"/>
+                <a:gd name="connsiteY14" fmla="*/ 2392500 h 2750820"/>
+                <a:gd name="connsiteX15" fmla="*/ 5939607 w 9776458"/>
+                <a:gd name="connsiteY15" fmla="*/ 1672500 h 2750820"/>
+                <a:gd name="connsiteX16" fmla="*/ 5939232 w 9776458"/>
+                <a:gd name="connsiteY16" fmla="*/ 1668780 h 2750820"/>
+                <a:gd name="connsiteX17" fmla="*/ 5939607 w 9776458"/>
+                <a:gd name="connsiteY17" fmla="*/ 1668780 h 2750820"/>
+                <a:gd name="connsiteX18" fmla="*/ 5939607 w 9776458"/>
+                <a:gd name="connsiteY18" fmla="*/ 0 h 2750820"/>
+                <a:gd name="connsiteX19" fmla="*/ 7360917 w 9776458"/>
+                <a:gd name="connsiteY19" fmla="*/ 0 h 2750820"/>
+                <a:gd name="connsiteX20" fmla="*/ 7360917 w 9776458"/>
+                <a:gd name="connsiteY20" fmla="*/ 1668780 h 2750820"/>
+                <a:gd name="connsiteX21" fmla="*/ 7361292 w 9776458"/>
+                <a:gd name="connsiteY21" fmla="*/ 1668780 h 2750820"/>
+                <a:gd name="connsiteX22" fmla="*/ 7360917 w 9776458"/>
+                <a:gd name="connsiteY22" fmla="*/ 1672500 h 2750820"/>
+                <a:gd name="connsiteX23" fmla="*/ 8080917 w 9776458"/>
+                <a:gd name="connsiteY23" fmla="*/ 2392500 h 2750820"/>
+                <a:gd name="connsiteX24" fmla="*/ 8800917 w 9776458"/>
+                <a:gd name="connsiteY24" fmla="*/ 1672500 h 2750820"/>
+                <a:gd name="connsiteX25" fmla="*/ 8800542 w 9776458"/>
+                <a:gd name="connsiteY25" fmla="*/ 1668780 h 2750820"/>
+                <a:gd name="connsiteX26" fmla="*/ 8800917 w 9776458"/>
+                <a:gd name="connsiteY26" fmla="*/ 1668780 h 2750820"/>
+                <a:gd name="connsiteX27" fmla="*/ 8800917 w 9776458"/>
+                <a:gd name="connsiteY27" fmla="*/ 0 h 2750820"/>
+                <a:gd name="connsiteX28" fmla="*/ 9776458 w 9776458"/>
+                <a:gd name="connsiteY28" fmla="*/ 0 h 2750820"/>
+                <a:gd name="connsiteX29" fmla="*/ 9776458 w 9776458"/>
+                <a:gd name="connsiteY29" fmla="*/ 2750820 h 2750820"/>
+                <a:gd name="connsiteX30" fmla="*/ 0 w 9776458"/>
+                <a:gd name="connsiteY30" fmla="*/ 2750820 h 2750820"/>
+              </a:gdLst>
+              <a:ahLst/>
+              <a:cxnLst>
+                <a:cxn ang="0">
+                  <a:pos x="connsiteX0" y="connsiteY0"/>
+                </a:cxn>
+                <a:cxn ang="0">
+                  <a:pos x="connsiteX1" y="connsiteY1"/>
+                </a:cxn>
+                <a:cxn ang="0">
+                  <a:pos x="connsiteX2" y="connsiteY2"/>
+                </a:cxn>
+                <a:cxn ang="0">
+                  <a:pos x="connsiteX3" y="connsiteY3"/>
+                </a:cxn>
+                <a:cxn ang="0">
+                  <a:pos x="connsiteX4" y="connsiteY4"/>
+                </a:cxn>
+                <a:cxn ang="0">
+                  <a:pos x="connsiteX5" y="connsiteY5"/>
+                </a:cxn>
+                <a:cxn ang="0">
+                  <a:pos x="connsiteX6" y="connsiteY6"/>
+                </a:cxn>
+                <a:cxn ang="0">
+                  <a:pos x="connsiteX7" y="connsiteY7"/>
+                </a:cxn>
+                <a:cxn ang="0">
+                  <a:pos x="connsiteX8" y="connsiteY8"/>
+                </a:cxn>
+                <a:cxn ang="0">
+                  <a:pos x="connsiteX9" y="connsiteY9"/>
+                </a:cxn>
+                <a:cxn ang="0">
+                  <a:pos x="connsiteX10" y="connsiteY10"/>
+                </a:cxn>
+                <a:cxn ang="0">
+                  <a:pos x="connsiteX11" y="connsiteY11"/>
+                </a:cxn>
+                <a:cxn ang="0">
+                  <a:pos x="connsiteX12" y="connsiteY12"/>
+                </a:cxn>
+                <a:cxn ang="0">
+                  <a:pos x="connsiteX13" y="connsiteY13"/>
+                </a:cxn>
+                <a:cxn ang="0">
+                  <a:pos x="connsiteX14" y="connsiteY14"/>
+                </a:cxn>
+                <a:cxn ang="0">
+                  <a:pos x="connsiteX15" y="connsiteY15"/>
+                </a:cxn>
+                <a:cxn ang="0">
+                  <a:pos x="connsiteX16" y="connsiteY16"/>
+                </a:cxn>
+                <a:cxn ang="0">
+                  <a:pos x="connsiteX17" y="connsiteY17"/>
+                </a:cxn>
+                <a:cxn ang="0">
+                  <a:pos x="connsiteX18" y="connsiteY18"/>
+                </a:cxn>
+                <a:cxn ang="0">
+                  <a:pos x="connsiteX19" y="connsiteY19"/>
+                </a:cxn>
+                <a:cxn ang="0">
+                  <a:pos x="connsiteX20" y="connsiteY20"/>
+                </a:cxn>
+                <a:cxn ang="0">
+                  <a:pos x="connsiteX21" y="connsiteY21"/>
+                </a:cxn>
+                <a:cxn ang="0">
+                  <a:pos x="connsiteX22" y="connsiteY22"/>
+                </a:cxn>
+                <a:cxn ang="0">
+                  <a:pos x="connsiteX23" y="connsiteY23"/>
+                </a:cxn>
+                <a:cxn ang="0">
+                  <a:pos x="connsiteX24" y="connsiteY24"/>
+                </a:cxn>
+                <a:cxn ang="0">
+                  <a:pos x="connsiteX25" y="connsiteY25"/>
+                </a:cxn>
+                <a:cxn ang="0">
+                  <a:pos x="connsiteX26" y="connsiteY26"/>
+                </a:cxn>
+                <a:cxn ang="0">
+                  <a:pos x="connsiteX27" y="connsiteY27"/>
+                </a:cxn>
+                <a:cxn ang="0">
+                  <a:pos x="connsiteX28" y="connsiteY28"/>
+                </a:cxn>
+                <a:cxn ang="0">
+                  <a:pos x="connsiteX29" y="connsiteY29"/>
+                </a:cxn>
+                <a:cxn ang="0">
+                  <a:pos x="connsiteX30" y="connsiteY30"/>
+                </a:cxn>
+              </a:cxnLst>
+              <a:rect l="l" t="t" r="r" b="b"/>
+              <a:pathLst>
+                <a:path w="9776458" h="2750820">
+                  <a:moveTo>
+                    <a:pt x="0" y="0"/>
+                  </a:moveTo>
+                  <a:lnTo>
+                    <a:pt x="1638298" y="0"/>
+                  </a:lnTo>
+                  <a:lnTo>
+                    <a:pt x="1638298" y="1668780"/>
+                  </a:lnTo>
+                  <a:lnTo>
+                    <a:pt x="1638673" y="1668780"/>
+                  </a:lnTo>
+                  <a:lnTo>
+                    <a:pt x="1638298" y="1672500"/>
+                  </a:lnTo>
+                  <a:cubicBezTo>
+                    <a:pt x="1638298" y="2070145"/>
+                    <a:pt x="1960653" y="2392500"/>
+                    <a:pt x="2358298" y="2392500"/>
+                  </a:cubicBezTo>
+                  <a:cubicBezTo>
+                    <a:pt x="2755942" y="2392500"/>
+                    <a:pt x="3078297" y="2070145"/>
+                    <a:pt x="3078297" y="1672500"/>
+                  </a:cubicBezTo>
+                  <a:lnTo>
+                    <a:pt x="3077922" y="1668780"/>
+                  </a:lnTo>
+                  <a:lnTo>
+                    <a:pt x="3078297" y="1668780"/>
+                  </a:lnTo>
+                  <a:lnTo>
+                    <a:pt x="3078297" y="0"/>
+                  </a:lnTo>
+                  <a:lnTo>
+                    <a:pt x="4499607" y="0"/>
+                  </a:lnTo>
+                  <a:lnTo>
+                    <a:pt x="4499607" y="1668780"/>
+                  </a:lnTo>
+                  <a:lnTo>
+                    <a:pt x="4499982" y="1668780"/>
+                  </a:lnTo>
+                  <a:lnTo>
+                    <a:pt x="4499607" y="1672500"/>
+                  </a:lnTo>
+                  <a:cubicBezTo>
+                    <a:pt x="4499607" y="2070145"/>
+                    <a:pt x="4821962" y="2392500"/>
+                    <a:pt x="5219607" y="2392500"/>
+                  </a:cubicBezTo>
+                  <a:cubicBezTo>
+                    <a:pt x="5617252" y="2392500"/>
+                    <a:pt x="5939607" y="2070145"/>
+                    <a:pt x="5939607" y="1672500"/>
+                  </a:cubicBezTo>
+                  <a:lnTo>
+                    <a:pt x="5939232" y="1668780"/>
+                  </a:lnTo>
+                  <a:lnTo>
+                    <a:pt x="5939607" y="1668780"/>
+                  </a:lnTo>
+                  <a:lnTo>
+                    <a:pt x="5939607" y="0"/>
+                  </a:lnTo>
+                  <a:lnTo>
+                    <a:pt x="7360917" y="0"/>
+                  </a:lnTo>
+                  <a:lnTo>
+                    <a:pt x="7360917" y="1668780"/>
+                  </a:lnTo>
+                  <a:lnTo>
+                    <a:pt x="7361292" y="1668780"/>
+                  </a:lnTo>
+                  <a:lnTo>
+                    <a:pt x="7360917" y="1672500"/>
+                  </a:lnTo>
+                  <a:cubicBezTo>
+                    <a:pt x="7360917" y="2070145"/>
+                    <a:pt x="7683272" y="2392500"/>
+                    <a:pt x="8080917" y="2392500"/>
+                  </a:cubicBezTo>
+                  <a:cubicBezTo>
+                    <a:pt x="8478562" y="2392500"/>
+                    <a:pt x="8800917" y="2070145"/>
+                    <a:pt x="8800917" y="1672500"/>
+                  </a:cubicBezTo>
+                  <a:lnTo>
+                    <a:pt x="8800542" y="1668780"/>
+                  </a:lnTo>
+                  <a:lnTo>
+                    <a:pt x="8800917" y="1668780"/>
+                  </a:lnTo>
+                  <a:lnTo>
+                    <a:pt x="8800917" y="0"/>
+                  </a:lnTo>
+                  <a:lnTo>
+                    <a:pt x="9776458" y="0"/>
+                  </a:lnTo>
+                  <a:lnTo>
+                    <a:pt x="9776458" y="2750820"/>
+                  </a:lnTo>
+                  <a:lnTo>
+                    <a:pt x="0" y="2750820"/>
+                  </a:lnTo>
+                  <a:close/>
+                </a:path>
+              </a:pathLst>
+            </a:custGeom>
             <a:solidFill>
+              <a:srgbClr val="7F7F7F"/>
+            </a:solidFill>
+            <a:ln w="28575">
+              <a:solidFill>
+                <a:schemeClr val="tx1"/>
+              </a:solidFill>
+            </a:ln>
+          </p:spPr>
+          <p:style>
+            <a:lnRef idx="2">
+              <a:schemeClr val="accent1">
+                <a:shade val="50000"/>
+              </a:schemeClr>
+            </a:lnRef>
+            <a:fillRef idx="1">
+              <a:schemeClr val="accent1"/>
+            </a:fillRef>
+            <a:effectRef idx="0">
+              <a:schemeClr val="accent1"/>
+            </a:effectRef>
+            <a:fontRef idx="minor">
+              <a:schemeClr val="lt1"/>
+            </a:fontRef>
+          </p:style>
+          <p:txBody>
+            <a:bodyPr rtlCol="0" anchor="ctr"/>
+            <a:lstStyle/>
+            <a:p>
+              <a:pPr algn="ctr"/>
+              <a:endParaRPr lang="en-US"/>
+            </a:p>
+          </p:txBody>
+        </p:sp>
+        <p:sp>
+          <p:nvSpPr>
+            <p:cNvPr id="12" name="직사각형 11"/>
+            <p:cNvSpPr/>
+            <p:nvPr/>
+          </p:nvSpPr>
+          <p:spPr>
+            <a:xfrm rot="19238228">
+              <a:off x="3800872" y="2933703"/>
+              <a:ext cx="937260" cy="228600"/>
+            </a:xfrm>
+            <a:prstGeom prst="rect">
+              <a:avLst/>
+            </a:prstGeom>
+            <a:solidFill>
+              <a:srgbClr val="7F7F7F"/>
+            </a:solidFill>
+            <a:ln w="28575">
+              <a:solidFill>
+                <a:schemeClr val="tx1"/>
+              </a:solidFill>
+            </a:ln>
+          </p:spPr>
+          <p:style>
+            <a:lnRef idx="2">
+              <a:schemeClr val="accent1">
+                <a:shade val="50000"/>
+              </a:schemeClr>
+            </a:lnRef>
+            <a:fillRef idx="1">
+              <a:schemeClr val="accent1"/>
+            </a:fillRef>
+            <a:effectRef idx="0">
+              <a:schemeClr val="accent1"/>
+            </a:effectRef>
+            <a:fontRef idx="minor">
+              <a:schemeClr val="lt1"/>
+            </a:fontRef>
+          </p:style>
+          <p:txBody>
+            <a:bodyPr rtlCol="0" anchor="ctr"/>
+            <a:lstStyle/>
+            <a:p>
+              <a:pPr algn="ctr"/>
+              <a:endParaRPr lang="en-US"/>
+            </a:p>
+          </p:txBody>
+        </p:sp>
+        <p:sp>
+          <p:nvSpPr>
+            <p:cNvPr id="53" name="직사각형 52"/>
+            <p:cNvSpPr/>
+            <p:nvPr/>
+          </p:nvSpPr>
+          <p:spPr>
+            <a:xfrm rot="19238228">
+              <a:off x="6686993" y="2933702"/>
+              <a:ext cx="937260" cy="228600"/>
+            </a:xfrm>
+            <a:prstGeom prst="rect">
+              <a:avLst/>
+            </a:prstGeom>
+            <a:solidFill>
+              <a:srgbClr val="7F7F7F"/>
+            </a:solidFill>
+            <a:ln w="28575">
+              <a:solidFill>
+                <a:schemeClr val="tx1"/>
+              </a:solidFill>
+            </a:ln>
+          </p:spPr>
+          <p:style>
+            <a:lnRef idx="2">
+              <a:schemeClr val="accent1">
+                <a:shade val="50000"/>
+              </a:schemeClr>
+            </a:lnRef>
+            <a:fillRef idx="1">
+              <a:schemeClr val="accent1"/>
+            </a:fillRef>
+            <a:effectRef idx="0">
+              <a:schemeClr val="accent1"/>
+            </a:effectRef>
+            <a:fontRef idx="minor">
+              <a:schemeClr val="lt1"/>
+            </a:fontRef>
+          </p:style>
+          <p:txBody>
+            <a:bodyPr rtlCol="0" anchor="ctr"/>
+            <a:lstStyle/>
+            <a:p>
+              <a:pPr algn="ctr"/>
+              <a:endParaRPr lang="en-US"/>
+            </a:p>
+          </p:txBody>
+        </p:sp>
+        <p:sp>
+          <p:nvSpPr>
+            <p:cNvPr id="54" name="직사각형 53"/>
+            <p:cNvSpPr/>
+            <p:nvPr/>
+          </p:nvSpPr>
+          <p:spPr>
+            <a:xfrm rot="19238228">
+              <a:off x="9477772" y="2933702"/>
+              <a:ext cx="937260" cy="228600"/>
+            </a:xfrm>
+            <a:prstGeom prst="rect">
+              <a:avLst/>
+            </a:prstGeom>
+            <a:solidFill>
+              <a:srgbClr val="7F7F7F"/>
+            </a:solidFill>
+            <a:ln w="28575">
+              <a:solidFill>
+                <a:schemeClr val="tx1"/>
+              </a:solidFill>
+            </a:ln>
+          </p:spPr>
+          <p:style>
+            <a:lnRef idx="2">
+              <a:schemeClr val="accent1">
+                <a:shade val="50000"/>
+              </a:schemeClr>
+            </a:lnRef>
+            <a:fillRef idx="1">
+              <a:schemeClr val="accent1"/>
+            </a:fillRef>
+            <a:effectRef idx="0">
+              <a:schemeClr val="accent1"/>
+            </a:effectRef>
+            <a:fontRef idx="minor">
+              <a:schemeClr val="lt1"/>
+            </a:fontRef>
+          </p:style>
+          <p:txBody>
+            <a:bodyPr rtlCol="0" anchor="ctr"/>
+            <a:lstStyle/>
+            <a:p>
+              <a:pPr algn="ctr"/>
+              <a:endParaRPr lang="en-US"/>
+            </a:p>
+          </p:txBody>
+        </p:sp>
+        <p:sp>
+          <p:nvSpPr>
+            <p:cNvPr id="55" name="타원 54"/>
+            <p:cNvSpPr/>
+            <p:nvPr/>
+          </p:nvSpPr>
+          <p:spPr>
+            <a:xfrm>
+              <a:off x="2202618" y="3027361"/>
+              <a:ext cx="333059" cy="333059"/>
+            </a:xfrm>
+            <a:prstGeom prst="ellipse">
+              <a:avLst/>
+            </a:prstGeom>
+            <a:solidFill>
+              <a:srgbClr val="7F7F7F"/>
+            </a:solidFill>
+            <a:ln w="19050">
+              <a:solidFill>
+                <a:schemeClr val="tx1"/>
+              </a:solidFill>
+            </a:ln>
+          </p:spPr>
+          <p:style>
+            <a:lnRef idx="2">
+              <a:schemeClr val="accent1">
+                <a:shade val="50000"/>
+              </a:schemeClr>
+            </a:lnRef>
+            <a:fillRef idx="1">
+              <a:schemeClr val="accent1"/>
+            </a:fillRef>
+            <a:effectRef idx="0">
+              <a:schemeClr val="accent1"/>
+            </a:effectRef>
+            <a:fontRef idx="minor">
+              <a:schemeClr val="lt1"/>
+            </a:fontRef>
+          </p:style>
+          <p:txBody>
+            <a:bodyPr rtlCol="0" anchor="ctr"/>
+            <a:lstStyle/>
+            <a:p>
+              <a:pPr algn="ctr"/>
+              <a:endParaRPr lang="en-US"/>
+            </a:p>
+          </p:txBody>
+        </p:sp>
+        <p:sp>
+          <p:nvSpPr>
+            <p:cNvPr id="56" name="타원 55"/>
+            <p:cNvSpPr/>
+            <p:nvPr/>
+          </p:nvSpPr>
+          <p:spPr>
+            <a:xfrm>
+              <a:off x="5165303" y="3027360"/>
+              <a:ext cx="333059" cy="333059"/>
+            </a:xfrm>
+            <a:prstGeom prst="ellipse">
+              <a:avLst/>
+            </a:prstGeom>
+            <a:solidFill>
+              <a:srgbClr val="7F7F7F"/>
+            </a:solidFill>
+            <a:ln w="19050">
+              <a:solidFill>
+                <a:schemeClr val="tx1"/>
+              </a:solidFill>
+            </a:ln>
+          </p:spPr>
+          <p:style>
+            <a:lnRef idx="2">
+              <a:schemeClr val="accent1">
+                <a:shade val="50000"/>
+              </a:schemeClr>
+            </a:lnRef>
+            <a:fillRef idx="1">
+              <a:schemeClr val="accent1"/>
+            </a:fillRef>
+            <a:effectRef idx="0">
+              <a:schemeClr val="accent1"/>
+            </a:effectRef>
+            <a:fontRef idx="minor">
+              <a:schemeClr val="lt1"/>
+            </a:fontRef>
+          </p:style>
+          <p:txBody>
+            <a:bodyPr rtlCol="0" anchor="ctr"/>
+            <a:lstStyle/>
+            <a:p>
+              <a:pPr algn="ctr"/>
+              <a:endParaRPr lang="en-US"/>
+            </a:p>
+          </p:txBody>
+        </p:sp>
+        <p:sp>
+          <p:nvSpPr>
+            <p:cNvPr id="57" name="타원 56"/>
+            <p:cNvSpPr/>
+            <p:nvPr/>
+          </p:nvSpPr>
+          <p:spPr>
+            <a:xfrm>
+              <a:off x="8051424" y="3027359"/>
+              <a:ext cx="333059" cy="333059"/>
+            </a:xfrm>
+            <a:prstGeom prst="ellipse">
+              <a:avLst/>
+            </a:prstGeom>
+            <a:solidFill>
+              <a:srgbClr val="7F7F7F"/>
+            </a:solidFill>
+            <a:ln w="19050">
+              <a:solidFill>
+                <a:schemeClr val="tx1"/>
+              </a:solidFill>
+            </a:ln>
+          </p:spPr>
+          <p:style>
+            <a:lnRef idx="2">
+              <a:schemeClr val="accent1">
+                <a:shade val="50000"/>
+              </a:schemeClr>
+            </a:lnRef>
+            <a:fillRef idx="1">
+              <a:schemeClr val="accent1"/>
+            </a:fillRef>
+            <a:effectRef idx="0">
+              <a:schemeClr val="accent1"/>
+            </a:effectRef>
+            <a:fontRef idx="minor">
+              <a:schemeClr val="lt1"/>
+            </a:fontRef>
+          </p:style>
+          <p:txBody>
+            <a:bodyPr rtlCol="0" anchor="ctr"/>
+            <a:lstStyle/>
+            <a:p>
+              <a:pPr algn="ctr"/>
+              <a:endParaRPr lang="en-US"/>
+            </a:p>
+          </p:txBody>
+        </p:sp>
+        <p:sp>
+          <p:nvSpPr>
+            <p:cNvPr id="58" name="타원 57"/>
+            <p:cNvSpPr/>
+            <p:nvPr/>
+          </p:nvSpPr>
+          <p:spPr>
+            <a:xfrm>
+              <a:off x="10697168" y="3027358"/>
+              <a:ext cx="333059" cy="333059"/>
+            </a:xfrm>
+            <a:prstGeom prst="ellipse">
+              <a:avLst/>
+            </a:prstGeom>
+            <a:solidFill>
+              <a:srgbClr val="7F7F7F"/>
+            </a:solidFill>
+            <a:ln w="19050">
+              <a:solidFill>
+                <a:schemeClr val="tx1"/>
+              </a:solidFill>
+            </a:ln>
+          </p:spPr>
+          <p:style>
+            <a:lnRef idx="2">
+              <a:schemeClr val="accent1">
+                <a:shade val="50000"/>
+              </a:schemeClr>
+            </a:lnRef>
+            <a:fillRef idx="1">
+              <a:schemeClr val="accent1"/>
+            </a:fillRef>
+            <a:effectRef idx="0">
+              <a:schemeClr val="accent1"/>
+            </a:effectRef>
+            <a:fontRef idx="minor">
+              <a:schemeClr val="lt1"/>
+            </a:fontRef>
+          </p:style>
+          <p:txBody>
+            <a:bodyPr rtlCol="0" anchor="ctr"/>
+            <a:lstStyle/>
+            <a:p>
+              <a:pPr algn="ctr"/>
+              <a:endParaRPr lang="en-US"/>
+            </a:p>
+          </p:txBody>
+        </p:sp>
+        <p:cxnSp>
+          <p:nvCxnSpPr>
+            <p:cNvPr id="59" name="직선 화살표 연결선 58"/>
+            <p:cNvCxnSpPr/>
+            <p:nvPr/>
+          </p:nvCxnSpPr>
+          <p:spPr>
+            <a:xfrm>
+              <a:off x="2127630" y="2876928"/>
+              <a:ext cx="508673" cy="0"/>
+            </a:xfrm>
+            <a:prstGeom prst="straightConnector1">
+              <a:avLst/>
+            </a:prstGeom>
+            <a:ln w="28575">
+              <a:tailEnd type="triangle"/>
+            </a:ln>
+          </p:spPr>
+          <p:style>
+            <a:lnRef idx="1">
+              <a:schemeClr val="dk1"/>
+            </a:lnRef>
+            <a:fillRef idx="0">
+              <a:schemeClr val="dk1"/>
+            </a:fillRef>
+            <a:effectRef idx="0">
+              <a:schemeClr val="dk1"/>
+            </a:effectRef>
+            <a:fontRef idx="minor">
               <a:schemeClr val="tx1"/>
-            </a:solidFill>
-          </a:ln>
-        </p:spPr>
-        <p:style>
-          <a:lnRef idx="2">
-            <a:schemeClr val="accent1">
-              <a:shade val="50000"/>
-            </a:schemeClr>
-          </a:lnRef>
-          <a:fillRef idx="1">
-            <a:schemeClr val="accent1"/>
-          </a:fillRef>
-          <a:effectRef idx="0">
-            <a:schemeClr val="accent1"/>
-          </a:effectRef>
-          <a:fontRef idx="minor">
-            <a:schemeClr val="lt1"/>
-          </a:fontRef>
-        </p:style>
-        <p:txBody>
-          <a:bodyPr rtlCol="0" anchor="ctr"/>
-          <a:lstStyle/>
-          <a:p>
-            <a:pPr algn="ctr"/>
-            <a:endParaRPr lang="en-US"/>
-          </a:p>
-        </p:txBody>
-      </p:sp>
-      <p:sp>
-        <p:nvSpPr>
-          <p:cNvPr id="53" name="직사각형 52"/>
-          <p:cNvSpPr/>
-          <p:nvPr/>
-        </p:nvSpPr>
-        <p:spPr>
-          <a:xfrm rot="19238228">
-            <a:off x="6686993" y="2933702"/>
-            <a:ext cx="937260" cy="228600"/>
-          </a:xfrm>
-          <a:prstGeom prst="rect">
-            <a:avLst/>
-          </a:prstGeom>
-          <a:solidFill>
-            <a:srgbClr val="7F7F7F"/>
-          </a:solidFill>
-          <a:ln w="28575">
-            <a:solidFill>
-              <a:schemeClr val="tx1"/>
-            </a:solidFill>
-          </a:ln>
-        </p:spPr>
-        <p:style>
-          <a:lnRef idx="2">
-            <a:schemeClr val="accent1">
-              <a:shade val="50000"/>
-            </a:schemeClr>
-          </a:lnRef>
-          <a:fillRef idx="1">
-            <a:schemeClr val="accent1"/>
-          </a:fillRef>
-          <a:effectRef idx="0">
-            <a:schemeClr val="accent1"/>
-          </a:effectRef>
-          <a:fontRef idx="minor">
-            <a:schemeClr val="lt1"/>
-          </a:fontRef>
-        </p:style>
-        <p:txBody>
-          <a:bodyPr rtlCol="0" anchor="ctr"/>
-          <a:lstStyle/>
-          <a:p>
-            <a:pPr algn="ctr"/>
-            <a:endParaRPr lang="en-US"/>
-          </a:p>
-        </p:txBody>
-      </p:sp>
-      <p:sp>
-        <p:nvSpPr>
-          <p:cNvPr id="54" name="직사각형 53"/>
-          <p:cNvSpPr/>
-          <p:nvPr/>
-        </p:nvSpPr>
-        <p:spPr>
-          <a:xfrm rot="19238228">
-            <a:off x="9477772" y="2933702"/>
-            <a:ext cx="937260" cy="228600"/>
-          </a:xfrm>
-          <a:prstGeom prst="rect">
-            <a:avLst/>
-          </a:prstGeom>
-          <a:solidFill>
-            <a:srgbClr val="7F7F7F"/>
-          </a:solidFill>
-          <a:ln w="28575">
-            <a:solidFill>
-              <a:schemeClr val="tx1"/>
-            </a:solidFill>
-          </a:ln>
-        </p:spPr>
-        <p:style>
-          <a:lnRef idx="2">
-            <a:schemeClr val="accent1">
-              <a:shade val="50000"/>
-            </a:schemeClr>
-          </a:lnRef>
-          <a:fillRef idx="1">
-            <a:schemeClr val="accent1"/>
-          </a:fillRef>
-          <a:effectRef idx="0">
-            <a:schemeClr val="accent1"/>
-          </a:effectRef>
-          <a:fontRef idx="minor">
-            <a:schemeClr val="lt1"/>
-          </a:fontRef>
-        </p:style>
-        <p:txBody>
-          <a:bodyPr rtlCol="0" anchor="ctr"/>
-          <a:lstStyle/>
-          <a:p>
-            <a:pPr algn="ctr"/>
-            <a:endParaRPr lang="en-US"/>
-          </a:p>
-        </p:txBody>
-      </p:sp>
-      <p:sp>
-        <p:nvSpPr>
-          <p:cNvPr id="55" name="타원 54"/>
-          <p:cNvSpPr/>
-          <p:nvPr/>
-        </p:nvSpPr>
-        <p:spPr>
-          <a:xfrm>
-            <a:off x="2202618" y="3027361"/>
-            <a:ext cx="333059" cy="333059"/>
-          </a:xfrm>
-          <a:prstGeom prst="ellipse">
-            <a:avLst/>
-          </a:prstGeom>
-          <a:solidFill>
-            <a:srgbClr val="7F7F7F"/>
-          </a:solidFill>
-          <a:ln w="19050">
-            <a:solidFill>
-              <a:schemeClr val="tx1"/>
-            </a:solidFill>
-          </a:ln>
-        </p:spPr>
-        <p:style>
-          <a:lnRef idx="2">
-            <a:schemeClr val="accent1">
-              <a:shade val="50000"/>
-            </a:schemeClr>
-          </a:lnRef>
-          <a:fillRef idx="1">
-            <a:schemeClr val="accent1"/>
-          </a:fillRef>
-          <a:effectRef idx="0">
-            <a:schemeClr val="accent1"/>
-          </a:effectRef>
-          <a:fontRef idx="minor">
-            <a:schemeClr val="lt1"/>
-          </a:fontRef>
-        </p:style>
-        <p:txBody>
-          <a:bodyPr rtlCol="0" anchor="ctr"/>
-          <a:lstStyle/>
-          <a:p>
-            <a:pPr algn="ctr"/>
-            <a:endParaRPr lang="en-US"/>
-          </a:p>
-        </p:txBody>
-      </p:sp>
-      <p:sp>
-        <p:nvSpPr>
-          <p:cNvPr id="56" name="타원 55"/>
-          <p:cNvSpPr/>
-          <p:nvPr/>
-        </p:nvSpPr>
-        <p:spPr>
-          <a:xfrm>
-            <a:off x="5165303" y="3027360"/>
-            <a:ext cx="333059" cy="333059"/>
-          </a:xfrm>
-          <a:prstGeom prst="ellipse">
-            <a:avLst/>
-          </a:prstGeom>
-          <a:solidFill>
-            <a:srgbClr val="7F7F7F"/>
-          </a:solidFill>
-          <a:ln w="19050">
-            <a:solidFill>
-              <a:schemeClr val="tx1"/>
-            </a:solidFill>
-          </a:ln>
-        </p:spPr>
-        <p:style>
-          <a:lnRef idx="2">
-            <a:schemeClr val="accent1">
-              <a:shade val="50000"/>
-            </a:schemeClr>
-          </a:lnRef>
-          <a:fillRef idx="1">
-            <a:schemeClr val="accent1"/>
-          </a:fillRef>
-          <a:effectRef idx="0">
-            <a:schemeClr val="accent1"/>
-          </a:effectRef>
-          <a:fontRef idx="minor">
-            <a:schemeClr val="lt1"/>
-          </a:fontRef>
-        </p:style>
-        <p:txBody>
-          <a:bodyPr rtlCol="0" anchor="ctr"/>
-          <a:lstStyle/>
-          <a:p>
-            <a:pPr algn="ctr"/>
-            <a:endParaRPr lang="en-US"/>
-          </a:p>
-        </p:txBody>
-      </p:sp>
-      <p:sp>
-        <p:nvSpPr>
-          <p:cNvPr id="57" name="타원 56"/>
-          <p:cNvSpPr/>
-          <p:nvPr/>
-        </p:nvSpPr>
-        <p:spPr>
-          <a:xfrm>
-            <a:off x="8051424" y="3027359"/>
-            <a:ext cx="333059" cy="333059"/>
-          </a:xfrm>
-          <a:prstGeom prst="ellipse">
-            <a:avLst/>
-          </a:prstGeom>
-          <a:solidFill>
-            <a:srgbClr val="7F7F7F"/>
-          </a:solidFill>
-          <a:ln w="19050">
-            <a:solidFill>
-              <a:schemeClr val="tx1"/>
-            </a:solidFill>
-          </a:ln>
-        </p:spPr>
-        <p:style>
-          <a:lnRef idx="2">
-            <a:schemeClr val="accent1">
-              <a:shade val="50000"/>
-            </a:schemeClr>
-          </a:lnRef>
-          <a:fillRef idx="1">
-            <a:schemeClr val="accent1"/>
-          </a:fillRef>
-          <a:effectRef idx="0">
-            <a:schemeClr val="accent1"/>
-          </a:effectRef>
-          <a:fontRef idx="minor">
-            <a:schemeClr val="lt1"/>
-          </a:fontRef>
-        </p:style>
-        <p:txBody>
-          <a:bodyPr rtlCol="0" anchor="ctr"/>
-          <a:lstStyle/>
-          <a:p>
-            <a:pPr algn="ctr"/>
-            <a:endParaRPr lang="en-US"/>
-          </a:p>
-        </p:txBody>
-      </p:sp>
-      <p:sp>
-        <p:nvSpPr>
-          <p:cNvPr id="58" name="타원 57"/>
-          <p:cNvSpPr/>
-          <p:nvPr/>
-        </p:nvSpPr>
-        <p:spPr>
-          <a:xfrm>
-            <a:off x="10697168" y="3027358"/>
-            <a:ext cx="333059" cy="333059"/>
-          </a:xfrm>
-          <a:prstGeom prst="ellipse">
-            <a:avLst/>
-          </a:prstGeom>
-          <a:solidFill>
-            <a:srgbClr val="7F7F7F"/>
-          </a:solidFill>
-          <a:ln w="19050">
-            <a:solidFill>
-              <a:schemeClr val="tx1"/>
-            </a:solidFill>
-          </a:ln>
-        </p:spPr>
-        <p:style>
-          <a:lnRef idx="2">
-            <a:schemeClr val="accent1">
-              <a:shade val="50000"/>
-            </a:schemeClr>
-          </a:lnRef>
-          <a:fillRef idx="1">
-            <a:schemeClr val="accent1"/>
-          </a:fillRef>
-          <a:effectRef idx="0">
-            <a:schemeClr val="accent1"/>
-          </a:effectRef>
-          <a:fontRef idx="minor">
-            <a:schemeClr val="lt1"/>
-          </a:fontRef>
-        </p:style>
-        <p:txBody>
-          <a:bodyPr rtlCol="0" anchor="ctr"/>
-          <a:lstStyle/>
-          <a:p>
-            <a:pPr algn="ctr"/>
-            <a:endParaRPr lang="en-US"/>
-          </a:p>
-        </p:txBody>
-      </p:sp>
-      <p:cxnSp>
-        <p:nvCxnSpPr>
-          <p:cNvPr id="59" name="직선 화살표 연결선 58"/>
-          <p:cNvCxnSpPr/>
-          <p:nvPr/>
-        </p:nvCxnSpPr>
-        <p:spPr>
-          <a:xfrm>
-            <a:off x="2127630" y="2876928"/>
-            <a:ext cx="508673" cy="0"/>
-          </a:xfrm>
-          <a:prstGeom prst="straightConnector1">
-            <a:avLst/>
-          </a:prstGeom>
-          <a:ln w="28575">
-            <a:tailEnd type="triangle"/>
-          </a:ln>
-        </p:spPr>
-        <p:style>
-          <a:lnRef idx="1">
-            <a:schemeClr val="dk1"/>
-          </a:lnRef>
-          <a:fillRef idx="0">
-            <a:schemeClr val="dk1"/>
-          </a:fillRef>
-          <a:effectRef idx="0">
-            <a:schemeClr val="dk1"/>
-          </a:effectRef>
-          <a:fontRef idx="minor">
-            <a:schemeClr val="tx1"/>
-          </a:fontRef>
-        </p:style>
-      </p:cxnSp>
+            </a:fontRef>
+          </p:style>
+        </p:cxnSp>
+      </p:grpSp>
       <p:sp>
         <p:nvSpPr>
           <p:cNvPr id="60" name="TextBox 59"/>
@@ -7559,7 +7518,7 @@
         <p:spPr>
           <a:xfrm>
             <a:off x="7170420" y="679125"/>
-            <a:ext cx="3893820" cy="1200329"/>
+            <a:ext cx="3893820" cy="1477328"/>
           </a:xfrm>
           <a:prstGeom prst="rect">
             <a:avLst/>
@@ -7573,33 +7532,16 @@
           <a:lstStyle/>
           <a:p>
             <a:r>
-              <a:rPr lang="ko-KR" altLang="en-US" smtClean="0">
+              <a:rPr lang="en-US" altLang="ko-KR">
                 <a:latin typeface="나눔스퀘어 Bold" panose="020B0600000101010101" pitchFamily="50" charset="-127"/>
                 <a:ea typeface="나눔스퀘어 Bold" panose="020B0600000101010101" pitchFamily="50" charset="-127"/>
               </a:rPr>
-              <a:t>공이 경사면을 지나고 대각선 으로 기울어진 직사각형에 부딪히면 정지해 있는 공과 충돌한다</a:t>
+              <a:t>When the ball crosses a slope and hits a diagonally inclined rectangle, it collides with a stationary ball. The stationary ball moves and a chain action occurs.</a:t>
             </a:r>
-            <a:r>
-              <a:rPr lang="en-US" altLang="ko-KR" smtClean="0">
-                <a:latin typeface="나눔스퀘어 Bold" panose="020B0600000101010101" pitchFamily="50" charset="-127"/>
-                <a:ea typeface="나눔스퀘어 Bold" panose="020B0600000101010101" pitchFamily="50" charset="-127"/>
-              </a:rPr>
-              <a:t>. </a:t>
-            </a:r>
-            <a:r>
-              <a:rPr lang="ko-KR" altLang="en-US" smtClean="0">
-                <a:latin typeface="나눔스퀘어 Bold" panose="020B0600000101010101" pitchFamily="50" charset="-127"/>
-                <a:ea typeface="나눔스퀘어 Bold" panose="020B0600000101010101" pitchFamily="50" charset="-127"/>
-              </a:rPr>
-              <a:t>정지해 있는 공이 움직이고 연쇄 작용이 일어난다</a:t>
-            </a:r>
-            <a:r>
-              <a:rPr lang="en-US" altLang="ko-KR" smtClean="0">
-                <a:latin typeface="나눔스퀘어 Bold" panose="020B0600000101010101" pitchFamily="50" charset="-127"/>
-                <a:ea typeface="나눔스퀘어 Bold" panose="020B0600000101010101" pitchFamily="50" charset="-127"/>
-              </a:rPr>
-              <a:t>.</a:t>
-            </a:r>
+            <a:endParaRPr lang="en-US" altLang="ko-KR" smtClean="0">
+              <a:latin typeface="나눔스퀘어 Bold" panose="020B0600000101010101" pitchFamily="50" charset="-127"/>
+              <a:ea typeface="나눔스퀘어 Bold" panose="020B0600000101010101" pitchFamily="50" charset="-127"/>
+            </a:endParaRPr>
           </a:p>
         </p:txBody>
       </p:sp>
@@ -8083,7 +8025,7 @@
         <p:spPr>
           <a:xfrm>
             <a:off x="7170420" y="1075030"/>
-            <a:ext cx="3893820" cy="1200329"/>
+            <a:ext cx="3893820" cy="1477328"/>
           </a:xfrm>
           <a:prstGeom prst="rect">
             <a:avLst/>
@@ -8097,47 +8039,16 @@
           <a:lstStyle/>
           <a:p>
             <a:r>
-              <a:rPr lang="ko-KR" altLang="en-US" smtClean="0">
+              <a:rPr lang="en-US" altLang="ko-KR">
                 <a:latin typeface="나눔스퀘어 Bold" panose="020B0600000101010101" pitchFamily="50" charset="-127"/>
                 <a:ea typeface="나눔스퀘어 Bold" panose="020B0600000101010101" pitchFamily="50" charset="-127"/>
               </a:rPr>
-              <a:t>오른쪽으로부터 굴러온 공이 연결된 공 </a:t>
+              <a:t>The ball rolling from the right collides with the eight connected balls, and the alpha value of the letter changes each time the ball enters the groove.</a:t>
             </a:r>
-            <a:r>
-              <a:rPr lang="en-US" altLang="ko-KR" smtClean="0">
-                <a:latin typeface="나눔스퀘어 Bold" panose="020B0600000101010101" pitchFamily="50" charset="-127"/>
-                <a:ea typeface="나눔스퀘어 Bold" panose="020B0600000101010101" pitchFamily="50" charset="-127"/>
-              </a:rPr>
-              <a:t>7</a:t>
-            </a:r>
-            <a:r>
-              <a:rPr lang="ko-KR" altLang="en-US" smtClean="0">
-                <a:latin typeface="나눔스퀘어 Bold" panose="020B0600000101010101" pitchFamily="50" charset="-127"/>
-                <a:ea typeface="나눔스퀘어 Bold" panose="020B0600000101010101" pitchFamily="50" charset="-127"/>
-              </a:rPr>
-              <a:t>개와 충돌하고 공이 홈에 들어갈 때 마다 낮은 알파 값은 글자의 알파값이 </a:t>
-            </a:r>
-            <a:r>
-              <a:rPr lang="en-US" altLang="ko-KR" smtClean="0">
-                <a:latin typeface="나눔스퀘어 Bold" panose="020B0600000101010101" pitchFamily="50" charset="-127"/>
-                <a:ea typeface="나눔스퀘어 Bold" panose="020B0600000101010101" pitchFamily="50" charset="-127"/>
-              </a:rPr>
-              <a:t>0</a:t>
-            </a:r>
-            <a:r>
-              <a:rPr lang="ko-KR" altLang="en-US" smtClean="0">
-                <a:latin typeface="나눔스퀘어 Bold" panose="020B0600000101010101" pitchFamily="50" charset="-127"/>
-                <a:ea typeface="나눔스퀘어 Bold" panose="020B0600000101010101" pitchFamily="50" charset="-127"/>
-              </a:rPr>
-              <a:t>이 되면서 알파벳이 보이게 된다</a:t>
-            </a:r>
-            <a:r>
-              <a:rPr lang="en-US" altLang="ko-KR" smtClean="0">
-                <a:latin typeface="나눔스퀘어 Bold" panose="020B0600000101010101" pitchFamily="50" charset="-127"/>
-                <a:ea typeface="나눔스퀘어 Bold" panose="020B0600000101010101" pitchFamily="50" charset="-127"/>
-              </a:rPr>
-              <a:t>.</a:t>
-            </a:r>
+            <a:endParaRPr lang="en-US" altLang="ko-KR" smtClean="0">
+              <a:latin typeface="나눔스퀘어 Bold" panose="020B0600000101010101" pitchFamily="50" charset="-127"/>
+              <a:ea typeface="나눔스퀘어 Bold" panose="020B0600000101010101" pitchFamily="50" charset="-127"/>
+            </a:endParaRPr>
           </a:p>
         </p:txBody>
       </p:sp>
@@ -9194,6 +9105,15 @@
 </file>
 
 <file path=customXml/item1.xml><?xml version="1.0" encoding="utf-8"?>
+<?mso-contentType ?>
+<FormTemplates xmlns="http://schemas.microsoft.com/sharepoint/v3/contenttype/forms">
+  <Display>DocumentLibraryForm</Display>
+  <Edit>DocumentLibraryForm</Edit>
+  <New>DocumentLibraryForm</New>
+</FormTemplates>
+</file>
+
+<file path=customXml/item2.xml><?xml version="1.0" encoding="utf-8"?>
 <ct:contentTypeSchema xmlns:ct="http://schemas.microsoft.com/office/2006/metadata/contentType" xmlns:ma="http://schemas.microsoft.com/office/2006/metadata/properties/metaAttributes" ct:_="" ma:_="" ma:contentTypeName="문서" ma:contentTypeID="0x0101009AC0F43FD9BF964199581D56114B4C27" ma:contentTypeVersion="10" ma:contentTypeDescription="새 문서를 만듭니다." ma:contentTypeScope="" ma:versionID="ee838e45a38c58dcc61db522ed75a67f">
   <xsd:schema xmlns:xsd="http://www.w3.org/2001/XMLSchema" xmlns:xs="http://www.w3.org/2001/XMLSchema" xmlns:p="http://schemas.microsoft.com/office/2006/metadata/properties" xmlns:ns3="af16c2e8-b6bd-4b6b-b669-c2f78501a31f" targetNamespace="http://schemas.microsoft.com/office/2006/metadata/properties" ma:root="true" ma:fieldsID="d202d7ef5517e3e7d520d0df3b94d152" ns3:_="">
     <xsd:import namespace="af16c2e8-b6bd-4b6b-b669-c2f78501a31f"/>
@@ -9377,15 +9297,6 @@
 </ct:contentTypeSchema>
 </file>
 
-<file path=customXml/item2.xml><?xml version="1.0" encoding="utf-8"?>
-<?mso-contentType ?>
-<FormTemplates xmlns="http://schemas.microsoft.com/sharepoint/v3/contenttype/forms">
-  <Display>DocumentLibraryForm</Display>
-  <Edit>DocumentLibraryForm</Edit>
-  <New>DocumentLibraryForm</New>
-</FormTemplates>
-</file>
-
 <file path=customXml/item3.xml><?xml version="1.0" encoding="utf-8"?>
 <p:properties xmlns:p="http://schemas.microsoft.com/office/2006/metadata/properties" xmlns:xsi="http://www.w3.org/2001/XMLSchema-instance" xmlns:pc="http://schemas.microsoft.com/office/infopath/2007/PartnerControls">
   <documentManagement/>
@@ -9393,6 +9304,14 @@
 </file>
 
 <file path=customXml/itemProps1.xml><?xml version="1.0" encoding="utf-8"?>
+<ds:datastoreItem xmlns:ds="http://schemas.openxmlformats.org/officeDocument/2006/customXml" ds:itemID="{59B5B2C1-99DC-45A8-9D79-106C32B4C846}">
+  <ds:schemaRefs>
+    <ds:schemaRef ds:uri="http://schemas.microsoft.com/sharepoint/v3/contenttype/forms"/>
+  </ds:schemaRefs>
+</ds:datastoreItem>
+</file>
+
+<file path=customXml/itemProps2.xml><?xml version="1.0" encoding="utf-8"?>
 <ds:datastoreItem xmlns:ds="http://schemas.openxmlformats.org/officeDocument/2006/customXml" ds:itemID="{A2EF27F3-5F19-4D54-8E9B-DF7C2FA50C1D}">
   <ds:schemaRefs>
     <ds:schemaRef ds:uri="http://schemas.microsoft.com/office/2006/metadata/contentType"/>
@@ -9410,26 +9329,18 @@
 </ds:datastoreItem>
 </file>
 
-<file path=customXml/itemProps2.xml><?xml version="1.0" encoding="utf-8"?>
-<ds:datastoreItem xmlns:ds="http://schemas.openxmlformats.org/officeDocument/2006/customXml" ds:itemID="{59B5B2C1-99DC-45A8-9D79-106C32B4C846}">
-  <ds:schemaRefs>
-    <ds:schemaRef ds:uri="http://schemas.microsoft.com/sharepoint/v3/contenttype/forms"/>
-  </ds:schemaRefs>
-</ds:datastoreItem>
-</file>
-
 <file path=customXml/itemProps3.xml><?xml version="1.0" encoding="utf-8"?>
 <ds:datastoreItem xmlns:ds="http://schemas.openxmlformats.org/officeDocument/2006/customXml" ds:itemID="{1EC831F1-1CC6-44D4-9CF4-190331B1E768}">
   <ds:schemaRefs>
+    <ds:schemaRef ds:uri="http://purl.org/dc/terms/"/>
     <ds:schemaRef ds:uri="http://www.w3.org/XML/1998/namespace"/>
-    <ds:schemaRef ds:uri="http://purl.org/dc/terms/"/>
+    <ds:schemaRef ds:uri="af16c2e8-b6bd-4b6b-b669-c2f78501a31f"/>
     <ds:schemaRef ds:uri="http://purl.org/dc/elements/1.1/"/>
+    <ds:schemaRef ds:uri="http://schemas.microsoft.com/office/2006/documentManagement/types"/>
     <ds:schemaRef ds:uri="http://purl.org/dc/dcmitype/"/>
-    <ds:schemaRef ds:uri="http://schemas.microsoft.com/office/2006/documentManagement/types"/>
+    <ds:schemaRef ds:uri="http://schemas.microsoft.com/office/2006/metadata/properties"/>
     <ds:schemaRef ds:uri="http://schemas.microsoft.com/office/infopath/2007/PartnerControls"/>
-    <ds:schemaRef ds:uri="af16c2e8-b6bd-4b6b-b669-c2f78501a31f"/>
     <ds:schemaRef ds:uri="http://schemas.openxmlformats.org/package/2006/metadata/core-properties"/>
-    <ds:schemaRef ds:uri="http://schemas.microsoft.com/office/2006/metadata/properties"/>
   </ds:schemaRefs>
 </ds:datastoreItem>
 </file>
</xml_diff>